<commit_message>
Se agrega ppt e informe actualizados
</commit_message>
<xml_diff>
--- a/PptFundamentos.pptx
+++ b/PptFundamentos.pptx
@@ -7,14 +7,15 @@
   <p:sldIdLst>
     <p:sldId id="256" r:id="rId2"/>
     <p:sldId id="257" r:id="rId3"/>
-    <p:sldId id="263" r:id="rId4"/>
-    <p:sldId id="259" r:id="rId5"/>
-    <p:sldId id="264" r:id="rId6"/>
-    <p:sldId id="258" r:id="rId7"/>
-    <p:sldId id="261" r:id="rId8"/>
-    <p:sldId id="265" r:id="rId9"/>
-    <p:sldId id="262" r:id="rId10"/>
-    <p:sldId id="260" r:id="rId11"/>
+    <p:sldId id="266" r:id="rId4"/>
+    <p:sldId id="267" r:id="rId5"/>
+    <p:sldId id="263" r:id="rId6"/>
+    <p:sldId id="259" r:id="rId7"/>
+    <p:sldId id="264" r:id="rId8"/>
+    <p:sldId id="258" r:id="rId9"/>
+    <p:sldId id="261" r:id="rId10"/>
+    <p:sldId id="265" r:id="rId11"/>
+    <p:sldId id="260" r:id="rId12"/>
   </p:sldIdLst>
   <p:sldSz cx="12192000" cy="6858000"/>
   <p:notesSz cx="6858000" cy="9144000"/>
@@ -6551,7 +6552,7 @@
           <a:p>
             <a:fld id="{5E7AA473-D82F-4EFF-9DF7-AE6D83C51288}" type="datetime1">
               <a:rPr lang="en-US" smtClean="0"/>
-              <a:t>11/14/2022</a:t>
+              <a:t>11/16/2022</a:t>
             </a:fld>
             <a:endParaRPr lang="en-US"/>
           </a:p>
@@ -6805,7 +6806,7 @@
           <a:p>
             <a:fld id="{1E12F1F0-FE2D-4C1C-B320-8CB9BE735F0F}" type="datetime1">
               <a:rPr lang="en-US" smtClean="0"/>
-              <a:t>11/14/2022</a:t>
+              <a:t>11/16/2022</a:t>
             </a:fld>
             <a:endParaRPr lang="en-US"/>
           </a:p>
@@ -7073,7 +7074,7 @@
           <a:p>
             <a:fld id="{2CF1B96C-10FD-4EBC-9029-9652B7535D02}" type="datetime1">
               <a:rPr lang="en-US" smtClean="0"/>
-              <a:t>11/14/2022</a:t>
+              <a:t>11/16/2022</a:t>
             </a:fld>
             <a:endParaRPr lang="en-US"/>
           </a:p>
@@ -7327,7 +7328,7 @@
           <a:p>
             <a:fld id="{14878474-CC00-4A95-9D50-A41C12D1EEC4}" type="datetime1">
               <a:rPr lang="en-US" smtClean="0"/>
-              <a:t>11/14/2022</a:t>
+              <a:t>11/16/2022</a:t>
             </a:fld>
             <a:endParaRPr lang="en-US"/>
           </a:p>
@@ -7605,7 +7606,7 @@
           <a:p>
             <a:fld id="{7F38C8B4-7FBB-408F-BDB9-F0496874AFB2}" type="datetime1">
               <a:rPr lang="en-US" smtClean="0"/>
-              <a:t>11/14/2022</a:t>
+              <a:t>11/16/2022</a:t>
             </a:fld>
             <a:endParaRPr lang="en-US"/>
           </a:p>
@@ -7877,7 +7878,7 @@
           <a:p>
             <a:fld id="{2BB8EE20-A5E2-47D3-8F6D-A2BA7AB2E093}" type="datetime1">
               <a:rPr lang="en-US" smtClean="0"/>
-              <a:t>11/14/2022</a:t>
+              <a:t>11/16/2022</a:t>
             </a:fld>
             <a:endParaRPr lang="en-US"/>
           </a:p>
@@ -8435,7 +8436,7 @@
           <a:p>
             <a:fld id="{3382CF99-132F-413F-B7EF-71A5C33F2ED6}" type="datetime1">
               <a:rPr lang="en-US" smtClean="0"/>
-              <a:t>11/14/2022</a:t>
+              <a:t>11/16/2022</a:t>
             </a:fld>
             <a:endParaRPr lang="en-US"/>
           </a:p>
@@ -8577,7 +8578,7 @@
           <a:p>
             <a:fld id="{1F17AE06-98E0-4D9F-A059-92C3548821BB}" type="datetime1">
               <a:rPr lang="en-US" smtClean="0"/>
-              <a:t>11/14/2022</a:t>
+              <a:t>11/16/2022</a:t>
             </a:fld>
             <a:endParaRPr lang="en-US"/>
           </a:p>
@@ -8690,7 +8691,7 @@
           <a:p>
             <a:fld id="{FFBA00CA-3DDC-4705-B840-978EF5EA0707}" type="datetime1">
               <a:rPr lang="en-US" smtClean="0"/>
-              <a:t>11/14/2022</a:t>
+              <a:t>11/16/2022</a:t>
             </a:fld>
             <a:endParaRPr lang="en-US"/>
           </a:p>
@@ -9009,7 +9010,7 @@
           <a:p>
             <a:fld id="{FC366D49-0BBA-4C5A-AD96-6448CA63451A}" type="datetime1">
               <a:rPr lang="en-US" smtClean="0"/>
-              <a:t>11/14/2022</a:t>
+              <a:t>11/16/2022</a:t>
             </a:fld>
             <a:endParaRPr lang="en-US"/>
           </a:p>
@@ -9306,7 +9307,7 @@
           <a:p>
             <a:fld id="{4F4EB293-A316-472D-A8B4-6947CF1A12B7}" type="datetime1">
               <a:rPr lang="en-US" smtClean="0"/>
-              <a:t>11/14/2022</a:t>
+              <a:t>11/16/2022</a:t>
             </a:fld>
             <a:endParaRPr lang="en-US"/>
           </a:p>
@@ -9585,7 +9586,7 @@
           <a:p>
             <a:fld id="{734BCCD4-CEB1-405B-A443-DD9CBCBEA552}" type="datetime1">
               <a:rPr lang="en-US" smtClean="0"/>
-              <a:t>11/14/2022</a:t>
+              <a:t>11/16/2022</a:t>
             </a:fld>
             <a:endParaRPr lang="en-US"/>
           </a:p>
@@ -10568,9 +10569,7 @@
     <p:bg>
       <p:bgPr>
         <a:solidFill>
-          <a:schemeClr val="bg1">
-            <a:lumMod val="95000"/>
-          </a:schemeClr>
+          <a:schemeClr val="bg2"/>
         </a:solidFill>
         <a:effectLst/>
       </p:bgPr>
@@ -10589,12 +10588,72 @@
           <a:chExt cx="0" cy="0"/>
         </a:xfrm>
       </p:grpSpPr>
+      <p:sp useBgFill="1">
+        <p:nvSpPr>
+          <p:cNvPr id="9" name="Rectangle 8">
+            <a:extLst>
+              <a:ext uri="{FF2B5EF4-FFF2-40B4-BE49-F238E27FC236}">
+                <a16:creationId xmlns:a16="http://schemas.microsoft.com/office/drawing/2014/main" id="{04213918-F1EB-4BCE-BE23-F5E9851EE05C}"/>
+              </a:ext>
+              <a:ext uri="{C183D7F6-B498-43B3-948B-1728B52AA6E4}">
+                <adec:decorative xmlns:adec="http://schemas.microsoft.com/office/drawing/2017/decorative" val="1"/>
+              </a:ext>
+            </a:extLst>
+          </p:cNvPr>
+          <p:cNvSpPr>
+            <a:spLocks noGrp="1" noRot="1" noChangeAspect="1" noMove="1" noResize="1" noEditPoints="1" noAdjustHandles="1" noChangeArrowheads="1" noChangeShapeType="1" noTextEdit="1"/>
+          </p:cNvSpPr>
+          <p:nvPr>
+            <p:extLst>
+              <p:ext uri="{386F3935-93C4-4BCD-93E2-E3B085C9AB24}">
+                <p16:designElem xmlns:p16="http://schemas.microsoft.com/office/powerpoint/2015/main" val="1"/>
+              </p:ext>
+            </p:extLst>
+          </p:nvPr>
+        </p:nvSpPr>
+        <p:spPr>
+          <a:xfrm>
+            <a:off x="0" y="0"/>
+            <a:ext cx="12188952" cy="6857995"/>
+          </a:xfrm>
+          <a:prstGeom prst="rect">
+            <a:avLst/>
+          </a:prstGeom>
+          <a:ln>
+            <a:noFill/>
+          </a:ln>
+        </p:spPr>
+        <p:style>
+          <a:lnRef idx="2">
+            <a:schemeClr val="accent1">
+              <a:shade val="50000"/>
+            </a:schemeClr>
+          </a:lnRef>
+          <a:fillRef idx="1">
+            <a:schemeClr val="accent1"/>
+          </a:fillRef>
+          <a:effectRef idx="0">
+            <a:schemeClr val="accent1"/>
+          </a:effectRef>
+          <a:fontRef idx="minor">
+            <a:schemeClr val="lt1"/>
+          </a:fontRef>
+        </p:style>
+        <p:txBody>
+          <a:bodyPr rtlCol="0" anchor="ctr"/>
+          <a:lstStyle/>
+          <a:p>
+            <a:pPr algn="ctr"/>
+            <a:endParaRPr lang="en-US" dirty="0"/>
+          </a:p>
+        </p:txBody>
+      </p:sp>
       <p:sp>
         <p:nvSpPr>
           <p:cNvPr id="2" name="Título 1">
             <a:extLst>
               <a:ext uri="{FF2B5EF4-FFF2-40B4-BE49-F238E27FC236}">
-                <a16:creationId xmlns:a16="http://schemas.microsoft.com/office/drawing/2014/main" id="{CB99851C-75C1-EA41-B469-FFC5D4AA3D1B}"/>
+                <a16:creationId xmlns:a16="http://schemas.microsoft.com/office/drawing/2014/main" id="{6A5E11E4-2D63-A00C-FA49-F06D8966FDF0}"/>
               </a:ext>
             </a:extLst>
           </p:cNvPr>
@@ -10605,9 +10664,244 @@
             <p:ph type="title"/>
           </p:nvPr>
         </p:nvSpPr>
-        <p:spPr/>
+        <p:spPr>
+          <a:xfrm>
+            <a:off x="521208" y="976160"/>
+            <a:ext cx="11155680" cy="1636411"/>
+          </a:xfrm>
+        </p:spPr>
         <p:txBody>
-          <a:bodyPr/>
+          <a:bodyPr>
+            <a:normAutofit/>
+          </a:bodyPr>
+          <a:lstStyle/>
+          <a:p>
+            <a:r>
+              <a:rPr lang="es-ES" dirty="0"/>
+              <a:t>Características de MySQL</a:t>
+            </a:r>
+            <a:endParaRPr lang="es-MX" dirty="0"/>
+          </a:p>
+        </p:txBody>
+      </p:sp>
+      <p:sp>
+        <p:nvSpPr>
+          <p:cNvPr id="11" name="Rectangle 10">
+            <a:extLst>
+              <a:ext uri="{FF2B5EF4-FFF2-40B4-BE49-F238E27FC236}">
+                <a16:creationId xmlns:a16="http://schemas.microsoft.com/office/drawing/2014/main" id="{2062E862-C7F7-4CA1-B929-D0B75F5E9FB9}"/>
+              </a:ext>
+              <a:ext uri="{C183D7F6-B498-43B3-948B-1728B52AA6E4}">
+                <adec:decorative xmlns:adec="http://schemas.microsoft.com/office/drawing/2017/decorative" val="1"/>
+              </a:ext>
+            </a:extLst>
+          </p:cNvPr>
+          <p:cNvSpPr>
+            <a:spLocks noGrp="1" noRot="1" noChangeAspect="1" noMove="1" noResize="1" noEditPoints="1" noAdjustHandles="1" noChangeArrowheads="1" noChangeShapeType="1" noTextEdit="1"/>
+          </p:cNvSpPr>
+          <p:nvPr>
+            <p:extLst>
+              <p:ext uri="{386F3935-93C4-4BCD-93E2-E3B085C9AB24}">
+                <p16:designElem xmlns:p16="http://schemas.microsoft.com/office/powerpoint/2015/main" val="1"/>
+              </p:ext>
+            </p:extLst>
+          </p:nvPr>
+        </p:nvSpPr>
+        <p:spPr>
+          <a:xfrm>
+            <a:off x="517869" y="508090"/>
+            <a:ext cx="11155680" cy="149279"/>
+          </a:xfrm>
+          <a:prstGeom prst="rect">
+            <a:avLst/>
+          </a:prstGeom>
+          <a:solidFill>
+            <a:schemeClr val="tx1"/>
+          </a:solidFill>
+          <a:ln>
+            <a:noFill/>
+          </a:ln>
+        </p:spPr>
+        <p:style>
+          <a:lnRef idx="2">
+            <a:schemeClr val="accent1">
+              <a:shade val="50000"/>
+            </a:schemeClr>
+          </a:lnRef>
+          <a:fillRef idx="1">
+            <a:schemeClr val="accent1"/>
+          </a:fillRef>
+          <a:effectRef idx="0">
+            <a:schemeClr val="accent1"/>
+          </a:effectRef>
+          <a:fontRef idx="minor">
+            <a:schemeClr val="lt1"/>
+          </a:fontRef>
+        </p:style>
+        <p:txBody>
+          <a:bodyPr rtlCol="0" anchor="ctr"/>
+          <a:lstStyle/>
+          <a:p>
+            <a:pPr algn="ctr"/>
+            <a:endParaRPr lang="en-US"/>
+          </a:p>
+        </p:txBody>
+      </p:sp>
+      <p:graphicFrame>
+        <p:nvGraphicFramePr>
+          <p:cNvPr id="5" name="Marcador de contenido 2">
+            <a:extLst>
+              <a:ext uri="{FF2B5EF4-FFF2-40B4-BE49-F238E27FC236}">
+                <a16:creationId xmlns:a16="http://schemas.microsoft.com/office/drawing/2014/main" id="{3AAB82CC-535C-50D1-C4C8-F0C3AF0F6C9D}"/>
+              </a:ext>
+            </a:extLst>
+          </p:cNvPr>
+          <p:cNvGraphicFramePr>
+            <a:graphicFrameLocks noGrp="1"/>
+          </p:cNvGraphicFramePr>
+          <p:nvPr>
+            <p:ph idx="1"/>
+            <p:extLst>
+              <p:ext uri="{D42A27DB-BD31-4B8C-83A1-F6EECF244321}">
+                <p14:modId xmlns:p14="http://schemas.microsoft.com/office/powerpoint/2010/main" val="3590701855"/>
+              </p:ext>
+            </p:extLst>
+          </p:nvPr>
+        </p:nvGraphicFramePr>
+        <p:xfrm>
+          <a:off x="528320" y="2780521"/>
+          <a:ext cx="11155680" cy="3517642"/>
+        </p:xfrm>
+        <a:graphic>
+          <a:graphicData uri="http://schemas.openxmlformats.org/drawingml/2006/diagram">
+            <dgm:relIds xmlns:dgm="http://schemas.openxmlformats.org/drawingml/2006/diagram" xmlns:r="http://schemas.openxmlformats.org/officeDocument/2006/relationships" r:dm="rId2" r:lo="rId3" r:qs="rId4" r:cs="rId5"/>
+          </a:graphicData>
+        </a:graphic>
+      </p:graphicFrame>
+    </p:spTree>
+    <p:extLst>
+      <p:ext uri="{BB962C8B-B14F-4D97-AF65-F5344CB8AC3E}">
+        <p14:creationId xmlns:p14="http://schemas.microsoft.com/office/powerpoint/2010/main" val="2735820308"/>
+      </p:ext>
+    </p:extLst>
+  </p:cSld>
+  <p:clrMapOvr>
+    <a:masterClrMapping/>
+  </p:clrMapOvr>
+</p:sld>
+</file>
+
+<file path=ppt/slides/slide11.xml><?xml version="1.0" encoding="utf-8"?>
+<p:sld xmlns:a="http://schemas.openxmlformats.org/drawingml/2006/main" xmlns:r="http://schemas.openxmlformats.org/officeDocument/2006/relationships" xmlns:p="http://schemas.openxmlformats.org/presentationml/2006/main">
+  <p:cSld>
+    <p:bg>
+      <p:bgPr>
+        <a:solidFill>
+          <a:schemeClr val="bg2"/>
+        </a:solidFill>
+        <a:effectLst/>
+      </p:bgPr>
+    </p:bg>
+    <p:spTree>
+      <p:nvGrpSpPr>
+        <p:cNvPr id="1" name=""/>
+        <p:cNvGrpSpPr/>
+        <p:nvPr/>
+      </p:nvGrpSpPr>
+      <p:grpSpPr>
+        <a:xfrm>
+          <a:off x="0" y="0"/>
+          <a:ext cx="0" cy="0"/>
+          <a:chOff x="0" y="0"/>
+          <a:chExt cx="0" cy="0"/>
+        </a:xfrm>
+      </p:grpSpPr>
+      <p:sp useBgFill="1">
+        <p:nvSpPr>
+          <p:cNvPr id="21" name="Rectangle 8">
+            <a:extLst>
+              <a:ext uri="{FF2B5EF4-FFF2-40B4-BE49-F238E27FC236}">
+                <a16:creationId xmlns:a16="http://schemas.microsoft.com/office/drawing/2014/main" id="{34C0330F-1D4F-4552-B799-615DD237B6DE}"/>
+              </a:ext>
+              <a:ext uri="{C183D7F6-B498-43B3-948B-1728B52AA6E4}">
+                <adec:decorative xmlns:adec="http://schemas.microsoft.com/office/drawing/2017/decorative" val="1"/>
+              </a:ext>
+            </a:extLst>
+          </p:cNvPr>
+          <p:cNvSpPr>
+            <a:spLocks noGrp="1" noRot="1" noChangeAspect="1" noMove="1" noResize="1" noEditPoints="1" noAdjustHandles="1" noChangeArrowheads="1" noChangeShapeType="1" noTextEdit="1"/>
+          </p:cNvSpPr>
+          <p:nvPr>
+            <p:extLst>
+              <p:ext uri="{386F3935-93C4-4BCD-93E2-E3B085C9AB24}">
+                <p16:designElem xmlns:p16="http://schemas.microsoft.com/office/powerpoint/2015/main" val="1"/>
+              </p:ext>
+            </p:extLst>
+          </p:nvPr>
+        </p:nvSpPr>
+        <p:spPr>
+          <a:xfrm>
+            <a:off x="0" y="0"/>
+            <a:ext cx="12188952" cy="6857995"/>
+          </a:xfrm>
+          <a:prstGeom prst="rect">
+            <a:avLst/>
+          </a:prstGeom>
+          <a:ln>
+            <a:noFill/>
+          </a:ln>
+        </p:spPr>
+        <p:style>
+          <a:lnRef idx="2">
+            <a:schemeClr val="accent1">
+              <a:shade val="50000"/>
+            </a:schemeClr>
+          </a:lnRef>
+          <a:fillRef idx="1">
+            <a:schemeClr val="accent1"/>
+          </a:fillRef>
+          <a:effectRef idx="0">
+            <a:schemeClr val="accent1"/>
+          </a:effectRef>
+          <a:fontRef idx="minor">
+            <a:schemeClr val="lt1"/>
+          </a:fontRef>
+        </p:style>
+        <p:txBody>
+          <a:bodyPr rtlCol="0" anchor="ctr"/>
+          <a:lstStyle/>
+          <a:p>
+            <a:pPr algn="ctr"/>
+            <a:endParaRPr lang="en-US" dirty="0"/>
+          </a:p>
+        </p:txBody>
+      </p:sp>
+      <p:sp>
+        <p:nvSpPr>
+          <p:cNvPr id="2" name="Título 1">
+            <a:extLst>
+              <a:ext uri="{FF2B5EF4-FFF2-40B4-BE49-F238E27FC236}">
+                <a16:creationId xmlns:a16="http://schemas.microsoft.com/office/drawing/2014/main" id="{CB99851C-75C1-EA41-B469-FFC5D4AA3D1B}"/>
+              </a:ext>
+            </a:extLst>
+          </p:cNvPr>
+          <p:cNvSpPr>
+            <a:spLocks noGrp="1"/>
+          </p:cNvSpPr>
+          <p:nvPr>
+            <p:ph type="title"/>
+          </p:nvPr>
+        </p:nvSpPr>
+        <p:spPr>
+          <a:xfrm>
+            <a:off x="6652947" y="976160"/>
+            <a:ext cx="5021183" cy="1934172"/>
+          </a:xfrm>
+        </p:spPr>
+        <p:txBody>
+          <a:bodyPr>
+            <a:normAutofit/>
+          </a:bodyPr>
           <a:lstStyle/>
           <a:p>
             <a:r>
@@ -10618,6 +10912,99 @@
           </a:p>
         </p:txBody>
       </p:sp>
+      <p:sp>
+        <p:nvSpPr>
+          <p:cNvPr id="22" name="Rectangle 10">
+            <a:extLst>
+              <a:ext uri="{FF2B5EF4-FFF2-40B4-BE49-F238E27FC236}">
+                <a16:creationId xmlns:a16="http://schemas.microsoft.com/office/drawing/2014/main" id="{C1F1676C-F2A4-4F2A-95E0-0AAB6995769F}"/>
+              </a:ext>
+              <a:ext uri="{C183D7F6-B498-43B3-948B-1728B52AA6E4}">
+                <adec:decorative xmlns:adec="http://schemas.microsoft.com/office/drawing/2017/decorative" val="1"/>
+              </a:ext>
+            </a:extLst>
+          </p:cNvPr>
+          <p:cNvSpPr>
+            <a:spLocks noGrp="1" noRot="1" noChangeAspect="1" noMove="1" noResize="1" noEditPoints="1" noAdjustHandles="1" noChangeArrowheads="1" noChangeShapeType="1" noTextEdit="1"/>
+          </p:cNvSpPr>
+          <p:nvPr>
+            <p:extLst>
+              <p:ext uri="{386F3935-93C4-4BCD-93E2-E3B085C9AB24}">
+                <p16:designElem xmlns:p16="http://schemas.microsoft.com/office/powerpoint/2015/main" val="1"/>
+              </p:ext>
+            </p:extLst>
+          </p:nvPr>
+        </p:nvSpPr>
+        <p:spPr>
+          <a:xfrm>
+            <a:off x="6652947" y="508090"/>
+            <a:ext cx="5021183" cy="149279"/>
+          </a:xfrm>
+          <a:prstGeom prst="rect">
+            <a:avLst/>
+          </a:prstGeom>
+          <a:solidFill>
+            <a:schemeClr val="tx1"/>
+          </a:solidFill>
+          <a:ln>
+            <a:noFill/>
+          </a:ln>
+        </p:spPr>
+        <p:style>
+          <a:lnRef idx="2">
+            <a:schemeClr val="accent1">
+              <a:shade val="50000"/>
+            </a:schemeClr>
+          </a:lnRef>
+          <a:fillRef idx="1">
+            <a:schemeClr val="accent1"/>
+          </a:fillRef>
+          <a:effectRef idx="0">
+            <a:schemeClr val="accent1"/>
+          </a:effectRef>
+          <a:fontRef idx="minor">
+            <a:schemeClr val="lt1"/>
+          </a:fontRef>
+        </p:style>
+        <p:txBody>
+          <a:bodyPr rtlCol="0" anchor="ctr"/>
+          <a:lstStyle/>
+          <a:p>
+            <a:pPr algn="ctr"/>
+            <a:endParaRPr lang="en-US"/>
+          </a:p>
+        </p:txBody>
+      </p:sp>
+      <p:pic>
+        <p:nvPicPr>
+          <p:cNvPr id="4" name="Imagen 3">
+            <a:extLst>
+              <a:ext uri="{FF2B5EF4-FFF2-40B4-BE49-F238E27FC236}">
+                <a16:creationId xmlns:a16="http://schemas.microsoft.com/office/drawing/2014/main" id="{C0C46754-277B-76B3-148D-E4ADD3675C85}"/>
+              </a:ext>
+            </a:extLst>
+          </p:cNvPr>
+          <p:cNvPicPr>
+            <a:picLocks noChangeAspect="1"/>
+          </p:cNvPicPr>
+          <p:nvPr/>
+        </p:nvPicPr>
+        <p:blipFill>
+          <a:blip r:embed="rId2"/>
+          <a:stretch>
+            <a:fillRect/>
+          </a:stretch>
+        </p:blipFill>
+        <p:spPr>
+          <a:xfrm>
+            <a:off x="511011" y="1063708"/>
+            <a:ext cx="5028041" cy="4963128"/>
+          </a:xfrm>
+          <a:prstGeom prst="rect">
+            <a:avLst/>
+          </a:prstGeom>
+        </p:spPr>
+      </p:pic>
       <p:sp>
         <p:nvSpPr>
           <p:cNvPr id="3" name="Marcador de contenido 2">
@@ -10634,12 +11021,99 @@
             <p:ph idx="1"/>
           </p:nvPr>
         </p:nvSpPr>
-        <p:spPr/>
+        <p:spPr>
+          <a:xfrm>
+            <a:off x="6652947" y="3172570"/>
+            <a:ext cx="4945183" cy="3016294"/>
+          </a:xfrm>
+        </p:spPr>
         <p:txBody>
-          <a:bodyPr/>
+          <a:bodyPr>
+            <a:normAutofit/>
+          </a:bodyPr>
           <a:lstStyle/>
           <a:p>
-            <a:endParaRPr lang="es-CL"/>
+            <a:r>
+              <a:rPr lang="es-CL">
+                <a:effectLst/>
+                <a:latin typeface="Calibri" panose="020F0502020204030204" pitchFamily="34" charset="0"/>
+                <a:ea typeface="Calibri" panose="020F0502020204030204" pitchFamily="34" charset="0"/>
+                <a:cs typeface="Times New Roman" panose="02020603050405020304" pitchFamily="18" charset="0"/>
+              </a:rPr>
+              <a:t>En este trabajo se aprendió mas sobre el funcionamiento de Python y como entrelazarlo con la base de datos, también se estudió sobre la depresión y como se puede detectar a través de preguntas relacionadas a diferentes tipos de actividades.</a:t>
+            </a:r>
+            <a:endParaRPr lang="es-MX">
+              <a:effectLst/>
+              <a:latin typeface="Calibri" panose="020F0502020204030204" pitchFamily="34" charset="0"/>
+              <a:ea typeface="Calibri" panose="020F0502020204030204" pitchFamily="34" charset="0"/>
+              <a:cs typeface="Times New Roman" panose="02020603050405020304" pitchFamily="18" charset="0"/>
+            </a:endParaRPr>
+          </a:p>
+          <a:p>
+            <a:endParaRPr lang="es-CL" dirty="0"/>
+          </a:p>
+        </p:txBody>
+      </p:sp>
+      <p:sp>
+        <p:nvSpPr>
+          <p:cNvPr id="23" name="Rectangle 12">
+            <a:extLst>
+              <a:ext uri="{FF2B5EF4-FFF2-40B4-BE49-F238E27FC236}">
+                <a16:creationId xmlns:a16="http://schemas.microsoft.com/office/drawing/2014/main" id="{9322A652-16AB-4D19-AA9B-F65C1123603A}"/>
+              </a:ext>
+              <a:ext uri="{C183D7F6-B498-43B3-948B-1728B52AA6E4}">
+                <adec:decorative xmlns:adec="http://schemas.microsoft.com/office/drawing/2017/decorative" val="1"/>
+              </a:ext>
+            </a:extLst>
+          </p:cNvPr>
+          <p:cNvSpPr>
+            <a:spLocks noGrp="1" noRot="1" noChangeAspect="1" noMove="1" noResize="1" noEditPoints="1" noAdjustHandles="1" noChangeArrowheads="1" noChangeShapeType="1" noTextEdit="1"/>
+          </p:cNvSpPr>
+          <p:nvPr>
+            <p:extLst>
+              <p:ext uri="{386F3935-93C4-4BCD-93E2-E3B085C9AB24}">
+                <p16:designElem xmlns:p16="http://schemas.microsoft.com/office/powerpoint/2015/main" val="1"/>
+              </p:ext>
+            </p:extLst>
+          </p:nvPr>
+        </p:nvSpPr>
+        <p:spPr>
+          <a:xfrm>
+            <a:off x="517869" y="6209925"/>
+            <a:ext cx="5021183" cy="45719"/>
+          </a:xfrm>
+          <a:prstGeom prst="rect">
+            <a:avLst/>
+          </a:prstGeom>
+          <a:solidFill>
+            <a:schemeClr val="tx1"/>
+          </a:solidFill>
+          <a:ln>
+            <a:noFill/>
+          </a:ln>
+        </p:spPr>
+        <p:style>
+          <a:lnRef idx="2">
+            <a:schemeClr val="accent1">
+              <a:shade val="50000"/>
+            </a:schemeClr>
+          </a:lnRef>
+          <a:fillRef idx="1">
+            <a:schemeClr val="accent1"/>
+          </a:fillRef>
+          <a:effectRef idx="0">
+            <a:schemeClr val="accent1"/>
+          </a:effectRef>
+          <a:fontRef idx="minor">
+            <a:schemeClr val="lt1"/>
+          </a:fontRef>
+        </p:style>
+        <p:txBody>
+          <a:bodyPr rtlCol="0" anchor="ctr"/>
+          <a:lstStyle/>
+          <a:p>
+            <a:pPr algn="ctr"/>
+            <a:endParaRPr lang="en-US"/>
           </a:p>
         </p:txBody>
       </p:sp>
@@ -10870,6 +11344,24 @@
           </a:bodyPr>
           <a:lstStyle/>
           <a:p>
+            <a:pPr algn="just"/>
+            <a:r>
+              <a:rPr lang="es-CL" sz="2000" dirty="0">
+                <a:effectLst/>
+                <a:latin typeface="Calibri" panose="020F0502020204030204" pitchFamily="34" charset="0"/>
+                <a:ea typeface="Calibri" panose="020F0502020204030204" pitchFamily="34" charset="0"/>
+                <a:cs typeface="Times New Roman" panose="02020603050405020304" pitchFamily="18" charset="0"/>
+              </a:rPr>
+              <a:t>En este proyecto se utilizará Python para así crear un código que sea capaz de crear una encuesta con una serie de preguntas ponderadas, esto con tal de poder generar un diagnóstico en base a las respuestas.</a:t>
+            </a:r>
+            <a:endParaRPr lang="es-MX" sz="2000" dirty="0">
+              <a:effectLst/>
+              <a:latin typeface="Calibri" panose="020F0502020204030204" pitchFamily="34" charset="0"/>
+              <a:ea typeface="Calibri" panose="020F0502020204030204" pitchFamily="34" charset="0"/>
+              <a:cs typeface="Times New Roman" panose="02020603050405020304" pitchFamily="18" charset="0"/>
+            </a:endParaRPr>
+          </a:p>
+          <a:p>
             <a:endParaRPr lang="es-CL" dirty="0"/>
           </a:p>
         </p:txBody>
@@ -10888,100 +11380,6 @@
 </file>
 
 <file path=ppt/slides/slide3.xml><?xml version="1.0" encoding="utf-8"?>
-<p:sld xmlns:a="http://schemas.openxmlformats.org/drawingml/2006/main" xmlns:r="http://schemas.openxmlformats.org/officeDocument/2006/relationships" xmlns:p="http://schemas.openxmlformats.org/presentationml/2006/main">
-  <p:cSld>
-    <p:bg>
-      <p:bgPr>
-        <a:solidFill>
-          <a:schemeClr val="bg1">
-            <a:lumMod val="95000"/>
-          </a:schemeClr>
-        </a:solidFill>
-        <a:effectLst/>
-      </p:bgPr>
-    </p:bg>
-    <p:spTree>
-      <p:nvGrpSpPr>
-        <p:cNvPr id="1" name=""/>
-        <p:cNvGrpSpPr/>
-        <p:nvPr/>
-      </p:nvGrpSpPr>
-      <p:grpSpPr>
-        <a:xfrm>
-          <a:off x="0" y="0"/>
-          <a:ext cx="0" cy="0"/>
-          <a:chOff x="0" y="0"/>
-          <a:chExt cx="0" cy="0"/>
-        </a:xfrm>
-      </p:grpSpPr>
-      <p:sp>
-        <p:nvSpPr>
-          <p:cNvPr id="2" name="Título 1">
-            <a:extLst>
-              <a:ext uri="{FF2B5EF4-FFF2-40B4-BE49-F238E27FC236}">
-                <a16:creationId xmlns:a16="http://schemas.microsoft.com/office/drawing/2014/main" id="{D7499F25-2711-BBEE-4CBC-1CA344121A8C}"/>
-              </a:ext>
-            </a:extLst>
-          </p:cNvPr>
-          <p:cNvSpPr>
-            <a:spLocks noGrp="1"/>
-          </p:cNvSpPr>
-          <p:nvPr>
-            <p:ph type="title"/>
-          </p:nvPr>
-        </p:nvSpPr>
-        <p:spPr/>
-        <p:txBody>
-          <a:bodyPr/>
-          <a:lstStyle/>
-          <a:p>
-            <a:r>
-              <a:rPr lang="es-MX" dirty="0"/>
-              <a:t>Lenguaje utilizado</a:t>
-            </a:r>
-            <a:endParaRPr lang="es-CL" dirty="0"/>
-          </a:p>
-        </p:txBody>
-      </p:sp>
-      <p:sp>
-        <p:nvSpPr>
-          <p:cNvPr id="3" name="Marcador de contenido 2">
-            <a:extLst>
-              <a:ext uri="{FF2B5EF4-FFF2-40B4-BE49-F238E27FC236}">
-                <a16:creationId xmlns:a16="http://schemas.microsoft.com/office/drawing/2014/main" id="{44877D6F-BED1-4F42-9F36-CCAEE4411995}"/>
-              </a:ext>
-            </a:extLst>
-          </p:cNvPr>
-          <p:cNvSpPr>
-            <a:spLocks noGrp="1"/>
-          </p:cNvSpPr>
-          <p:nvPr>
-            <p:ph idx="1"/>
-          </p:nvPr>
-        </p:nvSpPr>
-        <p:spPr/>
-        <p:txBody>
-          <a:bodyPr/>
-          <a:lstStyle/>
-          <a:p>
-            <a:endParaRPr lang="es-CL" dirty="0"/>
-          </a:p>
-        </p:txBody>
-      </p:sp>
-    </p:spTree>
-    <p:extLst>
-      <p:ext uri="{BB962C8B-B14F-4D97-AF65-F5344CB8AC3E}">
-        <p14:creationId xmlns:p14="http://schemas.microsoft.com/office/powerpoint/2010/main" val="603053628"/>
-      </p:ext>
-    </p:extLst>
-  </p:cSld>
-  <p:clrMapOvr>
-    <a:masterClrMapping/>
-  </p:clrMapOvr>
-</p:sld>
-</file>
-
-<file path=ppt/slides/slide4.xml><?xml version="1.0" encoding="utf-8"?>
 <p:sld xmlns:a="http://schemas.openxmlformats.org/drawingml/2006/main" xmlns:r="http://schemas.openxmlformats.org/officeDocument/2006/relationships" xmlns:p="http://schemas.openxmlformats.org/presentationml/2006/main">
   <p:cSld>
     <p:bg>
@@ -11008,10 +11406,10 @@
       </p:grpSpPr>
       <p:sp useBgFill="1">
         <p:nvSpPr>
-          <p:cNvPr id="2055" name="Rectangle 2054">
+          <p:cNvPr id="9" name="Rectangle 8">
             <a:extLst>
               <a:ext uri="{FF2B5EF4-FFF2-40B4-BE49-F238E27FC236}">
-                <a16:creationId xmlns:a16="http://schemas.microsoft.com/office/drawing/2014/main" id="{9E10BDB4-64F2-477D-A03B-9F8352D5E02E}"/>
+                <a16:creationId xmlns:a16="http://schemas.microsoft.com/office/drawing/2014/main" id="{34C0330F-1D4F-4552-B799-615DD237B6DE}"/>
               </a:ext>
               <a:ext uri="{C183D7F6-B498-43B3-948B-1728B52AA6E4}">
                 <adec:decorative xmlns:adec="http://schemas.microsoft.com/office/drawing/2017/decorative" val="1"/>
@@ -11068,10 +11466,10 @@
       </p:sp>
       <p:sp>
         <p:nvSpPr>
-          <p:cNvPr id="2057" name="Rectangle 2056">
+          <p:cNvPr id="11" name="Rectangle 10">
             <a:extLst>
               <a:ext uri="{FF2B5EF4-FFF2-40B4-BE49-F238E27FC236}">
-                <a16:creationId xmlns:a16="http://schemas.microsoft.com/office/drawing/2014/main" id="{823F9191-ED89-4F61-8B8F-97E567D96BA3}"/>
+                <a16:creationId xmlns:a16="http://schemas.microsoft.com/office/drawing/2014/main" id="{450C084C-2967-474A-B5F9-270F1FB43643}"/>
               </a:ext>
               <a:ext uri="{C183D7F6-B498-43B3-948B-1728B52AA6E4}">
                 <adec:decorative xmlns:adec="http://schemas.microsoft.com/office/drawing/2017/decorative" val="1"/>
@@ -11137,6 +11535,1181 @@
           <p:cNvPr id="2" name="Título 1">
             <a:extLst>
               <a:ext uri="{FF2B5EF4-FFF2-40B4-BE49-F238E27FC236}">
+                <a16:creationId xmlns:a16="http://schemas.microsoft.com/office/drawing/2014/main" id="{68AC2979-2153-64E5-7977-1D2AF67412B4}"/>
+              </a:ext>
+            </a:extLst>
+          </p:cNvPr>
+          <p:cNvSpPr>
+            <a:spLocks noGrp="1"/>
+          </p:cNvSpPr>
+          <p:nvPr>
+            <p:ph type="title"/>
+          </p:nvPr>
+        </p:nvSpPr>
+        <p:spPr>
+          <a:xfrm>
+            <a:off x="517870" y="976160"/>
+            <a:ext cx="5021183" cy="1934172"/>
+          </a:xfrm>
+        </p:spPr>
+        <p:txBody>
+          <a:bodyPr>
+            <a:normAutofit/>
+          </a:bodyPr>
+          <a:lstStyle/>
+          <a:p>
+            <a:r>
+              <a:rPr lang="es-ES" dirty="0"/>
+              <a:t>Objetivo</a:t>
+            </a:r>
+            <a:endParaRPr lang="es-MX" dirty="0"/>
+          </a:p>
+        </p:txBody>
+      </p:sp>
+      <p:sp>
+        <p:nvSpPr>
+          <p:cNvPr id="13" name="Rectangle 12">
+            <a:extLst>
+              <a:ext uri="{FF2B5EF4-FFF2-40B4-BE49-F238E27FC236}">
+                <a16:creationId xmlns:a16="http://schemas.microsoft.com/office/drawing/2014/main" id="{92BE0106-0C20-465B-A1BE-0BAC2737B1AD}"/>
+              </a:ext>
+              <a:ext uri="{C183D7F6-B498-43B3-948B-1728B52AA6E4}">
+                <adec:decorative xmlns:adec="http://schemas.microsoft.com/office/drawing/2017/decorative" val="1"/>
+              </a:ext>
+            </a:extLst>
+          </p:cNvPr>
+          <p:cNvSpPr>
+            <a:spLocks noGrp="1" noRot="1" noChangeAspect="1" noMove="1" noResize="1" noEditPoints="1" noAdjustHandles="1" noChangeArrowheads="1" noChangeShapeType="1" noTextEdit="1"/>
+          </p:cNvSpPr>
+          <p:nvPr>
+            <p:extLst>
+              <p:ext uri="{386F3935-93C4-4BCD-93E2-E3B085C9AB24}">
+                <p16:designElem xmlns:p16="http://schemas.microsoft.com/office/powerpoint/2015/main" val="1"/>
+              </p:ext>
+            </p:extLst>
+          </p:nvPr>
+        </p:nvSpPr>
+        <p:spPr>
+          <a:xfrm>
+            <a:off x="517870" y="508090"/>
+            <a:ext cx="5021183" cy="149279"/>
+          </a:xfrm>
+          <a:prstGeom prst="rect">
+            <a:avLst/>
+          </a:prstGeom>
+          <a:solidFill>
+            <a:schemeClr val="tx1"/>
+          </a:solidFill>
+          <a:ln>
+            <a:noFill/>
+          </a:ln>
+        </p:spPr>
+        <p:style>
+          <a:lnRef idx="2">
+            <a:schemeClr val="accent1">
+              <a:shade val="50000"/>
+            </a:schemeClr>
+          </a:lnRef>
+          <a:fillRef idx="1">
+            <a:schemeClr val="accent1"/>
+          </a:fillRef>
+          <a:effectRef idx="0">
+            <a:schemeClr val="accent1"/>
+          </a:effectRef>
+          <a:fontRef idx="minor">
+            <a:schemeClr val="lt1"/>
+          </a:fontRef>
+        </p:style>
+        <p:txBody>
+          <a:bodyPr rtlCol="0" anchor="ctr"/>
+          <a:lstStyle/>
+          <a:p>
+            <a:pPr algn="ctr"/>
+            <a:endParaRPr lang="en-US"/>
+          </a:p>
+        </p:txBody>
+      </p:sp>
+      <p:sp>
+        <p:nvSpPr>
+          <p:cNvPr id="3" name="Marcador de contenido 2">
+            <a:extLst>
+              <a:ext uri="{FF2B5EF4-FFF2-40B4-BE49-F238E27FC236}">
+                <a16:creationId xmlns:a16="http://schemas.microsoft.com/office/drawing/2014/main" id="{675CA385-42A1-9717-5EF7-88338A089683}"/>
+              </a:ext>
+            </a:extLst>
+          </p:cNvPr>
+          <p:cNvSpPr>
+            <a:spLocks noGrp="1"/>
+          </p:cNvSpPr>
+          <p:nvPr>
+            <p:ph idx="1"/>
+          </p:nvPr>
+        </p:nvSpPr>
+        <p:spPr>
+          <a:xfrm>
+            <a:off x="517870" y="3172570"/>
+            <a:ext cx="4945183" cy="3016294"/>
+          </a:xfrm>
+        </p:spPr>
+        <p:txBody>
+          <a:bodyPr>
+            <a:normAutofit/>
+          </a:bodyPr>
+          <a:lstStyle/>
+          <a:p>
+            <a:r>
+              <a:rPr lang="es-CL">
+                <a:effectLst/>
+                <a:latin typeface="Calibri" panose="020F0502020204030204" pitchFamily="34" charset="0"/>
+                <a:ea typeface="Calibri" panose="020F0502020204030204" pitchFamily="34" charset="0"/>
+                <a:cs typeface="Times New Roman" panose="02020603050405020304" pitchFamily="18" charset="0"/>
+              </a:rPr>
+              <a:t>Se busca realizar un sistema para un psicólogo  para que así este pueda observar el estado mental de sus pacientes y obtener un diagnostico.</a:t>
+            </a:r>
+            <a:endParaRPr lang="es-MX" dirty="0"/>
+          </a:p>
+        </p:txBody>
+      </p:sp>
+      <p:pic>
+        <p:nvPicPr>
+          <p:cNvPr id="4" name="Imagen 3">
+            <a:extLst>
+              <a:ext uri="{FF2B5EF4-FFF2-40B4-BE49-F238E27FC236}">
+                <a16:creationId xmlns:a16="http://schemas.microsoft.com/office/drawing/2014/main" id="{D4A6F7F7-0AD7-DBFD-65FB-D2918347D0F4}"/>
+              </a:ext>
+            </a:extLst>
+          </p:cNvPr>
+          <p:cNvPicPr>
+            <a:picLocks noChangeAspect="1"/>
+          </p:cNvPicPr>
+          <p:nvPr/>
+        </p:nvPicPr>
+        <p:blipFill rotWithShape="1">
+          <a:blip r:embed="rId2"/>
+          <a:srcRect l="32633" r="17032"/>
+          <a:stretch/>
+        </p:blipFill>
+        <p:spPr>
+          <a:xfrm>
+            <a:off x="6662167" y="657369"/>
+            <a:ext cx="4994209" cy="5531495"/>
+          </a:xfrm>
+          <a:prstGeom prst="rect">
+            <a:avLst/>
+          </a:prstGeom>
+        </p:spPr>
+      </p:pic>
+    </p:spTree>
+    <p:extLst>
+      <p:ext uri="{BB962C8B-B14F-4D97-AF65-F5344CB8AC3E}">
+        <p14:creationId xmlns:p14="http://schemas.microsoft.com/office/powerpoint/2010/main" val="344742103"/>
+      </p:ext>
+    </p:extLst>
+  </p:cSld>
+  <p:clrMapOvr>
+    <a:masterClrMapping/>
+  </p:clrMapOvr>
+</p:sld>
+</file>
+
+<file path=ppt/slides/slide4.xml><?xml version="1.0" encoding="utf-8"?>
+<p:sld xmlns:a="http://schemas.openxmlformats.org/drawingml/2006/main" xmlns:r="http://schemas.openxmlformats.org/officeDocument/2006/relationships" xmlns:p="http://schemas.openxmlformats.org/presentationml/2006/main">
+  <p:cSld>
+    <p:spTree>
+      <p:nvGrpSpPr>
+        <p:cNvPr id="1" name=""/>
+        <p:cNvGrpSpPr/>
+        <p:nvPr/>
+      </p:nvGrpSpPr>
+      <p:grpSpPr>
+        <a:xfrm>
+          <a:off x="0" y="0"/>
+          <a:ext cx="0" cy="0"/>
+          <a:chOff x="0" y="0"/>
+          <a:chExt cx="0" cy="0"/>
+        </a:xfrm>
+      </p:grpSpPr>
+      <p:sp>
+        <p:nvSpPr>
+          <p:cNvPr id="2" name="Título 1">
+            <a:extLst>
+              <a:ext uri="{FF2B5EF4-FFF2-40B4-BE49-F238E27FC236}">
+                <a16:creationId xmlns:a16="http://schemas.microsoft.com/office/drawing/2014/main" id="{9CC332C7-E1CE-ABD9-0F79-394BCAACE1D9}"/>
+              </a:ext>
+            </a:extLst>
+          </p:cNvPr>
+          <p:cNvSpPr>
+            <a:spLocks noGrp="1"/>
+          </p:cNvSpPr>
+          <p:nvPr>
+            <p:ph type="title"/>
+          </p:nvPr>
+        </p:nvSpPr>
+        <p:spPr/>
+        <p:txBody>
+          <a:bodyPr/>
+          <a:lstStyle/>
+          <a:p>
+            <a:r>
+              <a:rPr lang="es-ES" dirty="0"/>
+              <a:t>¿Qué es la depresión?</a:t>
+            </a:r>
+            <a:endParaRPr lang="es-MX" dirty="0"/>
+          </a:p>
+        </p:txBody>
+      </p:sp>
+      <p:sp>
+        <p:nvSpPr>
+          <p:cNvPr id="3" name="Marcador de contenido 2">
+            <a:extLst>
+              <a:ext uri="{FF2B5EF4-FFF2-40B4-BE49-F238E27FC236}">
+                <a16:creationId xmlns:a16="http://schemas.microsoft.com/office/drawing/2014/main" id="{F3DC4F2A-968A-DD30-13B7-934296B9C23C}"/>
+              </a:ext>
+            </a:extLst>
+          </p:cNvPr>
+          <p:cNvSpPr>
+            <a:spLocks noGrp="1"/>
+          </p:cNvSpPr>
+          <p:nvPr>
+            <p:ph idx="1"/>
+          </p:nvPr>
+        </p:nvSpPr>
+        <p:spPr>
+          <a:xfrm>
+            <a:off x="751304" y="6093470"/>
+            <a:ext cx="10689392" cy="4870457"/>
+          </a:xfrm>
+        </p:spPr>
+        <p:txBody>
+          <a:bodyPr/>
+          <a:lstStyle/>
+          <a:p>
+            <a:pPr algn="just"/>
+            <a:r>
+              <a:rPr lang="es-ES" dirty="0">
+                <a:solidFill>
+                  <a:srgbClr val="FF0000"/>
+                </a:solidFill>
+              </a:rPr>
+              <a:t>La depresión es un trastornó mental caracterizado por un bajo estado de animo se puede describir como el hecho de sentirse triste, melancólico, infeliz, abatido o derrumbado.</a:t>
+            </a:r>
+            <a:endParaRPr lang="es-MX" dirty="0">
+              <a:solidFill>
+                <a:srgbClr val="FF0000"/>
+              </a:solidFill>
+            </a:endParaRPr>
+          </a:p>
+        </p:txBody>
+      </p:sp>
+      <p:pic>
+        <p:nvPicPr>
+          <p:cNvPr id="5" name="Imagen 4">
+            <a:extLst>
+              <a:ext uri="{FF2B5EF4-FFF2-40B4-BE49-F238E27FC236}">
+                <a16:creationId xmlns:a16="http://schemas.microsoft.com/office/drawing/2014/main" id="{92902228-4CA4-1180-30C4-87CCC40DF399}"/>
+              </a:ext>
+            </a:extLst>
+          </p:cNvPr>
+          <p:cNvPicPr>
+            <a:picLocks noChangeAspect="1"/>
+          </p:cNvPicPr>
+          <p:nvPr/>
+        </p:nvPicPr>
+        <p:blipFill>
+          <a:blip r:embed="rId2"/>
+          <a:stretch>
+            <a:fillRect/>
+          </a:stretch>
+        </p:blipFill>
+        <p:spPr>
+          <a:xfrm>
+            <a:off x="-1" y="-17586"/>
+            <a:ext cx="12227313" cy="6111056"/>
+          </a:xfrm>
+          <a:prstGeom prst="rect">
+            <a:avLst/>
+          </a:prstGeom>
+        </p:spPr>
+      </p:pic>
+    </p:spTree>
+    <p:extLst>
+      <p:ext uri="{BB962C8B-B14F-4D97-AF65-F5344CB8AC3E}">
+        <p14:creationId xmlns:p14="http://schemas.microsoft.com/office/powerpoint/2010/main" val="1746989335"/>
+      </p:ext>
+    </p:extLst>
+  </p:cSld>
+  <p:clrMapOvr>
+    <a:masterClrMapping/>
+  </p:clrMapOvr>
+</p:sld>
+</file>
+
+<file path=ppt/slides/slide5.xml><?xml version="1.0" encoding="utf-8"?>
+<p:sld xmlns:a="http://schemas.openxmlformats.org/drawingml/2006/main" xmlns:r="http://schemas.openxmlformats.org/officeDocument/2006/relationships" xmlns:p="http://schemas.openxmlformats.org/presentationml/2006/main">
+  <p:cSld>
+    <p:bg>
+      <p:bgPr>
+        <a:solidFill>
+          <a:schemeClr val="bg2"/>
+        </a:solidFill>
+        <a:effectLst/>
+      </p:bgPr>
+    </p:bg>
+    <p:spTree>
+      <p:nvGrpSpPr>
+        <p:cNvPr id="1" name=""/>
+        <p:cNvGrpSpPr/>
+        <p:nvPr/>
+      </p:nvGrpSpPr>
+      <p:grpSpPr>
+        <a:xfrm>
+          <a:off x="0" y="0"/>
+          <a:ext cx="0" cy="0"/>
+          <a:chOff x="0" y="0"/>
+          <a:chExt cx="0" cy="0"/>
+        </a:xfrm>
+      </p:grpSpPr>
+      <p:sp>
+        <p:nvSpPr>
+          <p:cNvPr id="16" name="Rectangle 8">
+            <a:extLst>
+              <a:ext uri="{FF2B5EF4-FFF2-40B4-BE49-F238E27FC236}">
+                <a16:creationId xmlns:a16="http://schemas.microsoft.com/office/drawing/2014/main" id="{ADE57300-C7FF-4578-99A0-42B0295B123C}"/>
+              </a:ext>
+              <a:ext uri="{C183D7F6-B498-43B3-948B-1728B52AA6E4}">
+                <adec:decorative xmlns:adec="http://schemas.microsoft.com/office/drawing/2017/decorative" val="1"/>
+              </a:ext>
+            </a:extLst>
+          </p:cNvPr>
+          <p:cNvSpPr>
+            <a:spLocks noGrp="1" noRot="1" noChangeAspect="1" noMove="1" noResize="1" noEditPoints="1" noAdjustHandles="1" noChangeArrowheads="1" noChangeShapeType="1" noTextEdit="1"/>
+          </p:cNvSpPr>
+          <p:nvPr>
+            <p:extLst>
+              <p:ext uri="{386F3935-93C4-4BCD-93E2-E3B085C9AB24}">
+                <p16:designElem xmlns:p16="http://schemas.microsoft.com/office/powerpoint/2015/main" val="1"/>
+              </p:ext>
+            </p:extLst>
+          </p:nvPr>
+        </p:nvSpPr>
+        <p:spPr>
+          <a:xfrm>
+            <a:off x="517870" y="508090"/>
+            <a:ext cx="5021183" cy="149279"/>
+          </a:xfrm>
+          <a:prstGeom prst="rect">
+            <a:avLst/>
+          </a:prstGeom>
+          <a:solidFill>
+            <a:schemeClr val="tx1"/>
+          </a:solidFill>
+          <a:ln>
+            <a:noFill/>
+          </a:ln>
+        </p:spPr>
+        <p:style>
+          <a:lnRef idx="2">
+            <a:schemeClr val="accent1">
+              <a:shade val="50000"/>
+            </a:schemeClr>
+          </a:lnRef>
+          <a:fillRef idx="1">
+            <a:schemeClr val="accent1"/>
+          </a:fillRef>
+          <a:effectRef idx="0">
+            <a:schemeClr val="accent1"/>
+          </a:effectRef>
+          <a:fontRef idx="minor">
+            <a:schemeClr val="lt1"/>
+          </a:fontRef>
+        </p:style>
+        <p:txBody>
+          <a:bodyPr rtlCol="0" anchor="ctr"/>
+          <a:lstStyle/>
+          <a:p>
+            <a:pPr algn="ctr"/>
+            <a:endParaRPr lang="en-US"/>
+          </a:p>
+        </p:txBody>
+      </p:sp>
+      <p:sp>
+        <p:nvSpPr>
+          <p:cNvPr id="18" name="Rectangle 10">
+            <a:extLst>
+              <a:ext uri="{FF2B5EF4-FFF2-40B4-BE49-F238E27FC236}">
+                <a16:creationId xmlns:a16="http://schemas.microsoft.com/office/drawing/2014/main" id="{F3FF94B3-6D3E-44FE-BB02-A9027C0003C7}"/>
+              </a:ext>
+              <a:ext uri="{C183D7F6-B498-43B3-948B-1728B52AA6E4}">
+                <adec:decorative xmlns:adec="http://schemas.microsoft.com/office/drawing/2017/decorative" val="1"/>
+              </a:ext>
+            </a:extLst>
+          </p:cNvPr>
+          <p:cNvSpPr>
+            <a:spLocks noGrp="1" noRot="1" noChangeAspect="1" noMove="1" noResize="1" noEditPoints="1" noAdjustHandles="1" noChangeArrowheads="1" noChangeShapeType="1" noTextEdit="1"/>
+          </p:cNvSpPr>
+          <p:nvPr>
+            <p:extLst>
+              <p:ext uri="{386F3935-93C4-4BCD-93E2-E3B085C9AB24}">
+                <p16:designElem xmlns:p16="http://schemas.microsoft.com/office/powerpoint/2015/main" val="1"/>
+              </p:ext>
+            </p:extLst>
+          </p:nvPr>
+        </p:nvSpPr>
+        <p:spPr>
+          <a:xfrm>
+            <a:off x="6662168" y="6209925"/>
+            <a:ext cx="5021183" cy="45719"/>
+          </a:xfrm>
+          <a:prstGeom prst="rect">
+            <a:avLst/>
+          </a:prstGeom>
+          <a:solidFill>
+            <a:schemeClr val="tx1"/>
+          </a:solidFill>
+          <a:ln>
+            <a:noFill/>
+          </a:ln>
+        </p:spPr>
+        <p:style>
+          <a:lnRef idx="2">
+            <a:schemeClr val="accent1">
+              <a:shade val="50000"/>
+            </a:schemeClr>
+          </a:lnRef>
+          <a:fillRef idx="1">
+            <a:schemeClr val="accent1"/>
+          </a:fillRef>
+          <a:effectRef idx="0">
+            <a:schemeClr val="accent1"/>
+          </a:effectRef>
+          <a:fontRef idx="minor">
+            <a:schemeClr val="lt1"/>
+          </a:fontRef>
+        </p:style>
+        <p:txBody>
+          <a:bodyPr rtlCol="0" anchor="ctr"/>
+          <a:lstStyle/>
+          <a:p>
+            <a:pPr algn="ctr"/>
+            <a:endParaRPr lang="en-US"/>
+          </a:p>
+        </p:txBody>
+      </p:sp>
+      <p:sp useBgFill="1">
+        <p:nvSpPr>
+          <p:cNvPr id="20" name="Rectangle 12">
+            <a:extLst>
+              <a:ext uri="{FF2B5EF4-FFF2-40B4-BE49-F238E27FC236}">
+                <a16:creationId xmlns:a16="http://schemas.microsoft.com/office/drawing/2014/main" id="{E20BB609-EF92-42DB-836C-0699A590B5CF}"/>
+              </a:ext>
+              <a:ext uri="{C183D7F6-B498-43B3-948B-1728B52AA6E4}">
+                <adec:decorative xmlns:adec="http://schemas.microsoft.com/office/drawing/2017/decorative" val="1"/>
+              </a:ext>
+            </a:extLst>
+          </p:cNvPr>
+          <p:cNvSpPr>
+            <a:spLocks noGrp="1" noRot="1" noChangeAspect="1" noMove="1" noResize="1" noEditPoints="1" noAdjustHandles="1" noChangeArrowheads="1" noChangeShapeType="1" noTextEdit="1"/>
+          </p:cNvSpPr>
+          <p:nvPr>
+            <p:extLst>
+              <p:ext uri="{386F3935-93C4-4BCD-93E2-E3B085C9AB24}">
+                <p16:designElem xmlns:p16="http://schemas.microsoft.com/office/powerpoint/2015/main" val="1"/>
+              </p:ext>
+            </p:extLst>
+          </p:nvPr>
+        </p:nvSpPr>
+        <p:spPr>
+          <a:xfrm>
+            <a:off x="0" y="0"/>
+            <a:ext cx="12192000" cy="6858001"/>
+          </a:xfrm>
+          <a:prstGeom prst="rect">
+            <a:avLst/>
+          </a:prstGeom>
+          <a:ln>
+            <a:noFill/>
+          </a:ln>
+        </p:spPr>
+        <p:style>
+          <a:lnRef idx="2">
+            <a:schemeClr val="accent1">
+              <a:shade val="50000"/>
+            </a:schemeClr>
+          </a:lnRef>
+          <a:fillRef idx="1">
+            <a:schemeClr val="accent1"/>
+          </a:fillRef>
+          <a:effectRef idx="0">
+            <a:schemeClr val="accent1"/>
+          </a:effectRef>
+          <a:fontRef idx="minor">
+            <a:schemeClr val="lt1"/>
+          </a:fontRef>
+        </p:style>
+        <p:txBody>
+          <a:bodyPr rtlCol="0" anchor="ctr"/>
+          <a:lstStyle/>
+          <a:p>
+            <a:pPr algn="ctr"/>
+            <a:endParaRPr lang="en-US" dirty="0"/>
+          </a:p>
+        </p:txBody>
+      </p:sp>
+      <p:pic>
+        <p:nvPicPr>
+          <p:cNvPr id="4" name="Imagen 3">
+            <a:extLst>
+              <a:ext uri="{FF2B5EF4-FFF2-40B4-BE49-F238E27FC236}">
+                <a16:creationId xmlns:a16="http://schemas.microsoft.com/office/drawing/2014/main" id="{61A086A5-58C8-BB12-B45C-2A57643BD8E8}"/>
+              </a:ext>
+            </a:extLst>
+          </p:cNvPr>
+          <p:cNvPicPr>
+            <a:picLocks noChangeAspect="1"/>
+          </p:cNvPicPr>
+          <p:nvPr/>
+        </p:nvPicPr>
+        <p:blipFill rotWithShape="1">
+          <a:blip r:embed="rId2"/>
+          <a:srcRect r="7133" b="-1"/>
+          <a:stretch/>
+        </p:blipFill>
+        <p:spPr>
+          <a:xfrm>
+            <a:off x="20" y="9"/>
+            <a:ext cx="12188932" cy="7361843"/>
+          </a:xfrm>
+          <a:prstGeom prst="rect">
+            <a:avLst/>
+          </a:prstGeom>
+        </p:spPr>
+      </p:pic>
+      <p:sp>
+        <p:nvSpPr>
+          <p:cNvPr id="15" name="Rectangle 14">
+            <a:extLst>
+              <a:ext uri="{FF2B5EF4-FFF2-40B4-BE49-F238E27FC236}">
+                <a16:creationId xmlns:a16="http://schemas.microsoft.com/office/drawing/2014/main" id="{ECF0998E-D577-43EA-A7B8-E3EC67F75955}"/>
+              </a:ext>
+              <a:ext uri="{C183D7F6-B498-43B3-948B-1728B52AA6E4}">
+                <adec:decorative xmlns:adec="http://schemas.microsoft.com/office/drawing/2017/decorative" val="1"/>
+              </a:ext>
+            </a:extLst>
+          </p:cNvPr>
+          <p:cNvSpPr>
+            <a:spLocks noGrp="1" noRot="1" noChangeAspect="1" noMove="1" noResize="1" noEditPoints="1" noAdjustHandles="1" noChangeArrowheads="1" noChangeShapeType="1" noTextEdit="1"/>
+          </p:cNvSpPr>
+          <p:nvPr>
+            <p:extLst>
+              <p:ext uri="{386F3935-93C4-4BCD-93E2-E3B085C9AB24}">
+                <p16:designElem xmlns:p16="http://schemas.microsoft.com/office/powerpoint/2015/main" val="1"/>
+              </p:ext>
+            </p:extLst>
+          </p:nvPr>
+        </p:nvSpPr>
+        <p:spPr>
+          <a:xfrm rot="16200000">
+            <a:off x="389239" y="-389238"/>
+            <a:ext cx="6858000" cy="7636476"/>
+          </a:xfrm>
+          <a:prstGeom prst="rect">
+            <a:avLst/>
+          </a:prstGeom>
+          <a:gradFill>
+            <a:gsLst>
+              <a:gs pos="100000">
+                <a:srgbClr val="000000">
+                  <a:alpha val="0"/>
+                </a:srgbClr>
+              </a:gs>
+              <a:gs pos="0">
+                <a:schemeClr val="tx1"/>
+              </a:gs>
+              <a:gs pos="0">
+                <a:srgbClr val="000000">
+                  <a:alpha val="70000"/>
+                </a:srgbClr>
+              </a:gs>
+            </a:gsLst>
+            <a:lin ang="5400000" scaled="1"/>
+          </a:gradFill>
+          <a:ln>
+            <a:noFill/>
+          </a:ln>
+        </p:spPr>
+        <p:style>
+          <a:lnRef idx="2">
+            <a:schemeClr val="accent1">
+              <a:shade val="50000"/>
+            </a:schemeClr>
+          </a:lnRef>
+          <a:fillRef idx="1">
+            <a:schemeClr val="accent1"/>
+          </a:fillRef>
+          <a:effectRef idx="0">
+            <a:schemeClr val="accent1"/>
+          </a:effectRef>
+          <a:fontRef idx="minor">
+            <a:schemeClr val="lt1"/>
+          </a:fontRef>
+        </p:style>
+        <p:txBody>
+          <a:bodyPr rtlCol="0" anchor="ctr"/>
+          <a:lstStyle/>
+          <a:p>
+            <a:pPr algn="ctr"/>
+            <a:endParaRPr lang="en-US"/>
+          </a:p>
+        </p:txBody>
+      </p:sp>
+      <p:sp>
+        <p:nvSpPr>
+          <p:cNvPr id="17" name="Rectangle 16">
+            <a:extLst>
+              <a:ext uri="{FF2B5EF4-FFF2-40B4-BE49-F238E27FC236}">
+                <a16:creationId xmlns:a16="http://schemas.microsoft.com/office/drawing/2014/main" id="{B2C335F7-F61C-4EB4-80F2-4B1438FE66BB}"/>
+              </a:ext>
+              <a:ext uri="{C183D7F6-B498-43B3-948B-1728B52AA6E4}">
+                <adec:decorative xmlns:adec="http://schemas.microsoft.com/office/drawing/2017/decorative" val="1"/>
+              </a:ext>
+            </a:extLst>
+          </p:cNvPr>
+          <p:cNvSpPr>
+            <a:spLocks noGrp="1" noRot="1" noChangeAspect="1" noMove="1" noResize="1" noEditPoints="1" noAdjustHandles="1" noChangeArrowheads="1" noChangeShapeType="1" noTextEdit="1"/>
+          </p:cNvSpPr>
+          <p:nvPr>
+            <p:extLst>
+              <p:ext uri="{386F3935-93C4-4BCD-93E2-E3B085C9AB24}">
+                <p16:designElem xmlns:p16="http://schemas.microsoft.com/office/powerpoint/2015/main" val="1"/>
+              </p:ext>
+            </p:extLst>
+          </p:nvPr>
+        </p:nvSpPr>
+        <p:spPr>
+          <a:xfrm>
+            <a:off x="517870" y="508090"/>
+            <a:ext cx="5021183" cy="149279"/>
+          </a:xfrm>
+          <a:prstGeom prst="rect">
+            <a:avLst/>
+          </a:prstGeom>
+          <a:solidFill>
+            <a:srgbClr val="FFFFFF"/>
+          </a:solidFill>
+          <a:ln>
+            <a:noFill/>
+          </a:ln>
+        </p:spPr>
+        <p:style>
+          <a:lnRef idx="2">
+            <a:schemeClr val="accent1">
+              <a:shade val="50000"/>
+            </a:schemeClr>
+          </a:lnRef>
+          <a:fillRef idx="1">
+            <a:schemeClr val="accent1"/>
+          </a:fillRef>
+          <a:effectRef idx="0">
+            <a:schemeClr val="accent1"/>
+          </a:effectRef>
+          <a:fontRef idx="minor">
+            <a:schemeClr val="lt1"/>
+          </a:fontRef>
+        </p:style>
+        <p:txBody>
+          <a:bodyPr rtlCol="0" anchor="ctr"/>
+          <a:lstStyle/>
+          <a:p>
+            <a:pPr algn="ctr"/>
+            <a:endParaRPr lang="en-US"/>
+          </a:p>
+        </p:txBody>
+      </p:sp>
+      <p:sp>
+        <p:nvSpPr>
+          <p:cNvPr id="19" name="Rectangle 18">
+            <a:extLst>
+              <a:ext uri="{FF2B5EF4-FFF2-40B4-BE49-F238E27FC236}">
+                <a16:creationId xmlns:a16="http://schemas.microsoft.com/office/drawing/2014/main" id="{E7DC364D-882B-4786-89FB-1703C1A5CFF0}"/>
+              </a:ext>
+              <a:ext uri="{C183D7F6-B498-43B3-948B-1728B52AA6E4}">
+                <adec:decorative xmlns:adec="http://schemas.microsoft.com/office/drawing/2017/decorative" val="1"/>
+              </a:ext>
+            </a:extLst>
+          </p:cNvPr>
+          <p:cNvSpPr>
+            <a:spLocks noGrp="1" noRot="1" noChangeAspect="1" noMove="1" noResize="1" noEditPoints="1" noAdjustHandles="1" noChangeArrowheads="1" noChangeShapeType="1" noTextEdit="1"/>
+          </p:cNvSpPr>
+          <p:nvPr>
+            <p:extLst>
+              <p:ext uri="{386F3935-93C4-4BCD-93E2-E3B085C9AB24}">
+                <p16:designElem xmlns:p16="http://schemas.microsoft.com/office/powerpoint/2015/main" val="1"/>
+              </p:ext>
+            </p:extLst>
+          </p:nvPr>
+        </p:nvSpPr>
+        <p:spPr>
+          <a:xfrm rot="10800000">
+            <a:off x="1524" y="3205874"/>
+            <a:ext cx="12188952" cy="3652125"/>
+          </a:xfrm>
+          <a:prstGeom prst="rect">
+            <a:avLst/>
+          </a:prstGeom>
+          <a:gradFill>
+            <a:gsLst>
+              <a:gs pos="100000">
+                <a:srgbClr val="000000">
+                  <a:alpha val="0"/>
+                </a:srgbClr>
+              </a:gs>
+              <a:gs pos="0">
+                <a:schemeClr val="tx1"/>
+              </a:gs>
+              <a:gs pos="0">
+                <a:srgbClr val="000000">
+                  <a:alpha val="70000"/>
+                </a:srgbClr>
+              </a:gs>
+            </a:gsLst>
+            <a:lin ang="5400000" scaled="1"/>
+          </a:gradFill>
+          <a:ln>
+            <a:noFill/>
+          </a:ln>
+        </p:spPr>
+        <p:style>
+          <a:lnRef idx="2">
+            <a:schemeClr val="accent1">
+              <a:shade val="50000"/>
+            </a:schemeClr>
+          </a:lnRef>
+          <a:fillRef idx="1">
+            <a:schemeClr val="accent1"/>
+          </a:fillRef>
+          <a:effectRef idx="0">
+            <a:schemeClr val="accent1"/>
+          </a:effectRef>
+          <a:fontRef idx="minor">
+            <a:schemeClr val="lt1"/>
+          </a:fontRef>
+        </p:style>
+        <p:txBody>
+          <a:bodyPr rtlCol="0" anchor="ctr"/>
+          <a:lstStyle/>
+          <a:p>
+            <a:pPr algn="ctr"/>
+            <a:endParaRPr lang="en-US"/>
+          </a:p>
+        </p:txBody>
+      </p:sp>
+      <p:sp>
+        <p:nvSpPr>
+          <p:cNvPr id="2" name="Título 1">
+            <a:extLst>
+              <a:ext uri="{FF2B5EF4-FFF2-40B4-BE49-F238E27FC236}">
+                <a16:creationId xmlns:a16="http://schemas.microsoft.com/office/drawing/2014/main" id="{D7499F25-2711-BBEE-4CBC-1CA344121A8C}"/>
+              </a:ext>
+            </a:extLst>
+          </p:cNvPr>
+          <p:cNvSpPr>
+            <a:spLocks noGrp="1"/>
+          </p:cNvSpPr>
+          <p:nvPr>
+            <p:ph type="title"/>
+          </p:nvPr>
+        </p:nvSpPr>
+        <p:spPr>
+          <a:xfrm>
+            <a:off x="517870" y="978408"/>
+            <a:ext cx="5021182" cy="2334248"/>
+          </a:xfrm>
+        </p:spPr>
+        <p:txBody>
+          <a:bodyPr vert="horz" lIns="91440" tIns="45720" rIns="91440" bIns="45720" rtlCol="0" anchor="t">
+            <a:normAutofit/>
+          </a:bodyPr>
+          <a:lstStyle/>
+          <a:p>
+            <a:r>
+              <a:rPr lang="en-US">
+                <a:solidFill>
+                  <a:srgbClr val="FFFFFF"/>
+                </a:solidFill>
+              </a:rPr>
+              <a:t>Lenguaje utilizado</a:t>
+            </a:r>
+          </a:p>
+        </p:txBody>
+      </p:sp>
+      <p:sp>
+        <p:nvSpPr>
+          <p:cNvPr id="3" name="Marcador de contenido 2">
+            <a:extLst>
+              <a:ext uri="{FF2B5EF4-FFF2-40B4-BE49-F238E27FC236}">
+                <a16:creationId xmlns:a16="http://schemas.microsoft.com/office/drawing/2014/main" id="{44877D6F-BED1-4F42-9F36-CCAEE4411995}"/>
+              </a:ext>
+            </a:extLst>
+          </p:cNvPr>
+          <p:cNvSpPr>
+            <a:spLocks noGrp="1"/>
+          </p:cNvSpPr>
+          <p:nvPr>
+            <p:ph idx="1"/>
+          </p:nvPr>
+        </p:nvSpPr>
+        <p:spPr>
+          <a:xfrm>
+            <a:off x="6652366" y="4017818"/>
+            <a:ext cx="5040785" cy="1828799"/>
+          </a:xfrm>
+        </p:spPr>
+        <p:txBody>
+          <a:bodyPr vert="horz" lIns="91440" tIns="45720" rIns="91440" bIns="45720" rtlCol="0" anchor="b">
+            <a:normAutofit/>
+          </a:bodyPr>
+          <a:lstStyle/>
+          <a:p>
+            <a:pPr>
+              <a:lnSpc>
+                <a:spcPct val="100000"/>
+              </a:lnSpc>
+            </a:pPr>
+            <a:r>
+              <a:rPr lang="en-US" sz="2200" i="1">
+                <a:solidFill>
+                  <a:srgbClr val="FFFFFF"/>
+                </a:solidFill>
+              </a:rPr>
+              <a:t>Para el proyecto se utilizo el lenguaje de programación Python, este es un lenguaje de alto nivel. </a:t>
+            </a:r>
+          </a:p>
+        </p:txBody>
+      </p:sp>
+      <p:sp>
+        <p:nvSpPr>
+          <p:cNvPr id="21" name="Rectangle 20">
+            <a:extLst>
+              <a:ext uri="{FF2B5EF4-FFF2-40B4-BE49-F238E27FC236}">
+                <a16:creationId xmlns:a16="http://schemas.microsoft.com/office/drawing/2014/main" id="{F1189494-2B67-46D2-93D6-A122A09BF6B2}"/>
+              </a:ext>
+              <a:ext uri="{C183D7F6-B498-43B3-948B-1728B52AA6E4}">
+                <adec:decorative xmlns:adec="http://schemas.microsoft.com/office/drawing/2017/decorative" val="1"/>
+              </a:ext>
+            </a:extLst>
+          </p:cNvPr>
+          <p:cNvSpPr>
+            <a:spLocks noGrp="1" noRot="1" noChangeAspect="1" noMove="1" noResize="1" noEditPoints="1" noAdjustHandles="1" noChangeArrowheads="1" noChangeShapeType="1" noTextEdit="1"/>
+          </p:cNvSpPr>
+          <p:nvPr>
+            <p:extLst>
+              <p:ext uri="{386F3935-93C4-4BCD-93E2-E3B085C9AB24}">
+                <p16:designElem xmlns:p16="http://schemas.microsoft.com/office/powerpoint/2015/main" val="1"/>
+              </p:ext>
+            </p:extLst>
+          </p:nvPr>
+        </p:nvSpPr>
+        <p:spPr>
+          <a:xfrm>
+            <a:off x="6662168" y="6209925"/>
+            <a:ext cx="5021183" cy="45719"/>
+          </a:xfrm>
+          <a:prstGeom prst="rect">
+            <a:avLst/>
+          </a:prstGeom>
+          <a:solidFill>
+            <a:srgbClr val="FFFFFF"/>
+          </a:solidFill>
+          <a:ln>
+            <a:noFill/>
+          </a:ln>
+        </p:spPr>
+        <p:style>
+          <a:lnRef idx="2">
+            <a:schemeClr val="accent1">
+              <a:shade val="50000"/>
+            </a:schemeClr>
+          </a:lnRef>
+          <a:fillRef idx="1">
+            <a:schemeClr val="accent1"/>
+          </a:fillRef>
+          <a:effectRef idx="0">
+            <a:schemeClr val="accent1"/>
+          </a:effectRef>
+          <a:fontRef idx="minor">
+            <a:schemeClr val="lt1"/>
+          </a:fontRef>
+        </p:style>
+        <p:txBody>
+          <a:bodyPr rtlCol="0" anchor="ctr"/>
+          <a:lstStyle/>
+          <a:p>
+            <a:pPr algn="ctr"/>
+            <a:endParaRPr lang="en-US"/>
+          </a:p>
+        </p:txBody>
+      </p:sp>
+    </p:spTree>
+    <p:extLst>
+      <p:ext uri="{BB962C8B-B14F-4D97-AF65-F5344CB8AC3E}">
+        <p14:creationId xmlns:p14="http://schemas.microsoft.com/office/powerpoint/2010/main" val="603053628"/>
+      </p:ext>
+    </p:extLst>
+  </p:cSld>
+  <p:clrMapOvr>
+    <a:masterClrMapping/>
+  </p:clrMapOvr>
+  <p:timing>
+    <p:tnLst>
+      <p:par>
+        <p:cTn id="1" dur="indefinite" restart="never" nodeType="tmRoot">
+          <p:childTnLst>
+            <p:seq concurrent="1" nextAc="seek">
+              <p:cTn id="2" dur="indefinite" nodeType="mainSeq">
+                <p:childTnLst>
+                  <p:par>
+                    <p:cTn id="3" fill="hold">
+                      <p:stCondLst>
+                        <p:cond delay="indefinite"/>
+                        <p:cond evt="onBegin" delay="0">
+                          <p:tn val="2"/>
+                        </p:cond>
+                      </p:stCondLst>
+                      <p:childTnLst>
+                        <p:par>
+                          <p:cTn id="4" fill="hold">
+                            <p:stCondLst>
+                              <p:cond delay="0"/>
+                            </p:stCondLst>
+                            <p:childTnLst>
+                              <p:par>
+                                <p:cTn id="5" presetID="10" presetClass="entr" presetSubtype="0" fill="hold" grpId="0" nodeType="withEffect">
+                                  <p:stCondLst>
+                                    <p:cond delay="1000"/>
+                                  </p:stCondLst>
+                                  <p:iterate type="lt">
+                                    <p:tmPct val="10000"/>
+                                  </p:iterate>
+                                  <p:childTnLst>
+                                    <p:set>
+                                      <p:cBhvr>
+                                        <p:cTn id="6" dur="1" fill="hold">
+                                          <p:stCondLst>
+                                            <p:cond delay="0"/>
+                                          </p:stCondLst>
+                                        </p:cTn>
+                                        <p:tgtEl>
+                                          <p:spTgt spid="2"/>
+                                        </p:tgtEl>
+                                        <p:attrNameLst>
+                                          <p:attrName>style.visibility</p:attrName>
+                                        </p:attrNameLst>
+                                      </p:cBhvr>
+                                      <p:to>
+                                        <p:strVal val="visible"/>
+                                      </p:to>
+                                    </p:set>
+                                    <p:animEffect transition="in" filter="fade">
+                                      <p:cBhvr>
+                                        <p:cTn id="7" dur="400"/>
+                                        <p:tgtEl>
+                                          <p:spTgt spid="2"/>
+                                        </p:tgtEl>
+                                      </p:cBhvr>
+                                    </p:animEffect>
+                                  </p:childTnLst>
+                                </p:cTn>
+                              </p:par>
+                            </p:childTnLst>
+                          </p:cTn>
+                        </p:par>
+                      </p:childTnLst>
+                    </p:cTn>
+                  </p:par>
+                </p:childTnLst>
+              </p:cTn>
+              <p:prevCondLst>
+                <p:cond evt="onPrev" delay="0">
+                  <p:tgtEl>
+                    <p:sldTgt/>
+                  </p:tgtEl>
+                </p:cond>
+              </p:prevCondLst>
+              <p:nextCondLst>
+                <p:cond evt="onNext" delay="0">
+                  <p:tgtEl>
+                    <p:sldTgt/>
+                  </p:tgtEl>
+                </p:cond>
+              </p:nextCondLst>
+            </p:seq>
+          </p:childTnLst>
+        </p:cTn>
+      </p:par>
+    </p:tnLst>
+    <p:bldLst>
+      <p:bldP spid="2" grpId="0"/>
+    </p:bldLst>
+  </p:timing>
+</p:sld>
+</file>
+
+<file path=ppt/slides/slide6.xml><?xml version="1.0" encoding="utf-8"?>
+<p:sld xmlns:a="http://schemas.openxmlformats.org/drawingml/2006/main" xmlns:r="http://schemas.openxmlformats.org/officeDocument/2006/relationships" xmlns:p="http://schemas.openxmlformats.org/presentationml/2006/main">
+  <p:cSld>
+    <p:bg>
+      <p:bgPr>
+        <a:solidFill>
+          <a:schemeClr val="bg2"/>
+        </a:solidFill>
+        <a:effectLst/>
+      </p:bgPr>
+    </p:bg>
+    <p:spTree>
+      <p:nvGrpSpPr>
+        <p:cNvPr id="1" name=""/>
+        <p:cNvGrpSpPr/>
+        <p:nvPr/>
+      </p:nvGrpSpPr>
+      <p:grpSpPr>
+        <a:xfrm>
+          <a:off x="0" y="0"/>
+          <a:ext cx="0" cy="0"/>
+          <a:chOff x="0" y="0"/>
+          <a:chExt cx="0" cy="0"/>
+        </a:xfrm>
+      </p:grpSpPr>
+      <p:sp useBgFill="1">
+        <p:nvSpPr>
+          <p:cNvPr id="2055" name="Rectangle 2054">
+            <a:extLst>
+              <a:ext uri="{FF2B5EF4-FFF2-40B4-BE49-F238E27FC236}">
+                <a16:creationId xmlns:a16="http://schemas.microsoft.com/office/drawing/2014/main" id="{9E10BDB4-64F2-477D-A03B-9F8352D5E02E}"/>
+              </a:ext>
+              <a:ext uri="{C183D7F6-B498-43B3-948B-1728B52AA6E4}">
+                <adec:decorative xmlns:adec="http://schemas.microsoft.com/office/drawing/2017/decorative" val="1"/>
+              </a:ext>
+            </a:extLst>
+          </p:cNvPr>
+          <p:cNvSpPr>
+            <a:spLocks noGrp="1" noRot="1" noChangeAspect="1" noMove="1" noResize="1" noEditPoints="1" noAdjustHandles="1" noChangeArrowheads="1" noChangeShapeType="1" noTextEdit="1"/>
+          </p:cNvSpPr>
+          <p:nvPr>
+            <p:extLst>
+              <p:ext uri="{386F3935-93C4-4BCD-93E2-E3B085C9AB24}">
+                <p16:designElem xmlns:p16="http://schemas.microsoft.com/office/powerpoint/2015/main" val="1"/>
+              </p:ext>
+            </p:extLst>
+          </p:nvPr>
+        </p:nvSpPr>
+        <p:spPr>
+          <a:xfrm>
+            <a:off x="0" y="0"/>
+            <a:ext cx="12188952" cy="6857995"/>
+          </a:xfrm>
+          <a:prstGeom prst="rect">
+            <a:avLst/>
+          </a:prstGeom>
+          <a:ln>
+            <a:noFill/>
+          </a:ln>
+        </p:spPr>
+        <p:style>
+          <a:lnRef idx="2">
+            <a:schemeClr val="accent1">
+              <a:shade val="50000"/>
+            </a:schemeClr>
+          </a:lnRef>
+          <a:fillRef idx="1">
+            <a:schemeClr val="accent1"/>
+          </a:fillRef>
+          <a:effectRef idx="0">
+            <a:schemeClr val="accent1"/>
+          </a:effectRef>
+          <a:fontRef idx="minor">
+            <a:schemeClr val="lt1"/>
+          </a:fontRef>
+        </p:style>
+        <p:txBody>
+          <a:bodyPr rtlCol="0" anchor="ctr"/>
+          <a:lstStyle/>
+          <a:p>
+            <a:pPr algn="ctr"/>
+            <a:endParaRPr lang="en-US" dirty="0"/>
+          </a:p>
+        </p:txBody>
+      </p:sp>
+      <p:sp>
+        <p:nvSpPr>
+          <p:cNvPr id="2057" name="Rectangle 2056">
+            <a:extLst>
+              <a:ext uri="{FF2B5EF4-FFF2-40B4-BE49-F238E27FC236}">
+                <a16:creationId xmlns:a16="http://schemas.microsoft.com/office/drawing/2014/main" id="{823F9191-ED89-4F61-8B8F-97E567D96BA3}"/>
+              </a:ext>
+              <a:ext uri="{C183D7F6-B498-43B3-948B-1728B52AA6E4}">
+                <adec:decorative xmlns:adec="http://schemas.microsoft.com/office/drawing/2017/decorative" val="1"/>
+              </a:ext>
+            </a:extLst>
+          </p:cNvPr>
+          <p:cNvSpPr>
+            <a:spLocks noGrp="1" noRot="1" noChangeAspect="1" noMove="1" noResize="1" noEditPoints="1" noAdjustHandles="1" noChangeArrowheads="1" noChangeShapeType="1" noTextEdit="1"/>
+          </p:cNvSpPr>
+          <p:nvPr>
+            <p:extLst>
+              <p:ext uri="{386F3935-93C4-4BCD-93E2-E3B085C9AB24}">
+                <p16:designElem xmlns:p16="http://schemas.microsoft.com/office/powerpoint/2015/main" val="1"/>
+              </p:ext>
+            </p:extLst>
+          </p:nvPr>
+        </p:nvSpPr>
+        <p:spPr>
+          <a:xfrm>
+            <a:off x="0" y="0"/>
+            <a:ext cx="12188952" cy="6857995"/>
+          </a:xfrm>
+          <a:prstGeom prst="rect">
+            <a:avLst/>
+          </a:prstGeom>
+          <a:solidFill>
+            <a:schemeClr val="bg2">
+              <a:lumMod val="90000"/>
+              <a:alpha val="40000"/>
+            </a:schemeClr>
+          </a:solidFill>
+          <a:ln>
+            <a:noFill/>
+          </a:ln>
+        </p:spPr>
+        <p:style>
+          <a:lnRef idx="2">
+            <a:schemeClr val="accent1">
+              <a:shade val="50000"/>
+            </a:schemeClr>
+          </a:lnRef>
+          <a:fillRef idx="1">
+            <a:schemeClr val="accent1"/>
+          </a:fillRef>
+          <a:effectRef idx="0">
+            <a:schemeClr val="accent1"/>
+          </a:effectRef>
+          <a:fontRef idx="minor">
+            <a:schemeClr val="lt1"/>
+          </a:fontRef>
+        </p:style>
+        <p:txBody>
+          <a:bodyPr rtlCol="0" anchor="ctr"/>
+          <a:lstStyle/>
+          <a:p>
+            <a:pPr algn="ctr"/>
+            <a:endParaRPr lang="en-US" dirty="0"/>
+          </a:p>
+        </p:txBody>
+      </p:sp>
+      <p:sp>
+        <p:nvSpPr>
+          <p:cNvPr id="2" name="Título 1">
+            <a:extLst>
+              <a:ext uri="{FF2B5EF4-FFF2-40B4-BE49-F238E27FC236}">
                 <a16:creationId xmlns:a16="http://schemas.microsoft.com/office/drawing/2014/main" id="{BA3A55C6-D22D-EF59-70AC-C448A55D14A8}"/>
               </a:ext>
             </a:extLst>
@@ -11378,7 +12951,7 @@
 </p:sld>
 </file>
 
-<file path=ppt/slides/slide5.xml><?xml version="1.0" encoding="utf-8"?>
+<file path=ppt/slides/slide7.xml><?xml version="1.0" encoding="utf-8"?>
 <p:sld xmlns:a="http://schemas.openxmlformats.org/drawingml/2006/main" xmlns:r="http://schemas.openxmlformats.org/officeDocument/2006/relationships" xmlns:p="http://schemas.openxmlformats.org/presentationml/2006/main">
   <p:cSld>
     <p:bg>
@@ -11743,7 +13316,7 @@
 </p:sld>
 </file>
 
-<file path=ppt/slides/slide6.xml><?xml version="1.0" encoding="utf-8"?>
+<file path=ppt/slides/slide8.xml><?xml version="1.0" encoding="utf-8"?>
 <p:sld xmlns:a="http://schemas.openxmlformats.org/drawingml/2006/main" xmlns:r="http://schemas.openxmlformats.org/officeDocument/2006/relationships" xmlns:p="http://schemas.openxmlformats.org/presentationml/2006/main">
   <p:cSld>
     <p:bg>
@@ -12515,7 +14088,7 @@
 </p:sld>
 </file>
 
-<file path=ppt/slides/slide7.xml><?xml version="1.0" encoding="utf-8"?>
+<file path=ppt/slides/slide9.xml><?xml version="1.0" encoding="utf-8"?>
 <p:sld xmlns:a="http://schemas.openxmlformats.org/drawingml/2006/main" xmlns:r="http://schemas.openxmlformats.org/officeDocument/2006/relationships" xmlns:p="http://schemas.openxmlformats.org/presentationml/2006/main">
   <p:cSld>
     <p:bg>
@@ -12921,328 +14494,6 @@
     <p:extLst>
       <p:ext uri="{BB962C8B-B14F-4D97-AF65-F5344CB8AC3E}">
         <p14:creationId xmlns:p14="http://schemas.microsoft.com/office/powerpoint/2010/main" val="690567647"/>
-      </p:ext>
-    </p:extLst>
-  </p:cSld>
-  <p:clrMapOvr>
-    <a:masterClrMapping/>
-  </p:clrMapOvr>
-</p:sld>
-</file>
-
-<file path=ppt/slides/slide8.xml><?xml version="1.0" encoding="utf-8"?>
-<p:sld xmlns:a="http://schemas.openxmlformats.org/drawingml/2006/main" xmlns:r="http://schemas.openxmlformats.org/officeDocument/2006/relationships" xmlns:p="http://schemas.openxmlformats.org/presentationml/2006/main">
-  <p:cSld>
-    <p:bg>
-      <p:bgPr>
-        <a:solidFill>
-          <a:schemeClr val="bg2"/>
-        </a:solidFill>
-        <a:effectLst/>
-      </p:bgPr>
-    </p:bg>
-    <p:spTree>
-      <p:nvGrpSpPr>
-        <p:cNvPr id="1" name=""/>
-        <p:cNvGrpSpPr/>
-        <p:nvPr/>
-      </p:nvGrpSpPr>
-      <p:grpSpPr>
-        <a:xfrm>
-          <a:off x="0" y="0"/>
-          <a:ext cx="0" cy="0"/>
-          <a:chOff x="0" y="0"/>
-          <a:chExt cx="0" cy="0"/>
-        </a:xfrm>
-      </p:grpSpPr>
-      <p:sp useBgFill="1">
-        <p:nvSpPr>
-          <p:cNvPr id="9" name="Rectangle 8">
-            <a:extLst>
-              <a:ext uri="{FF2B5EF4-FFF2-40B4-BE49-F238E27FC236}">
-                <a16:creationId xmlns:a16="http://schemas.microsoft.com/office/drawing/2014/main" id="{04213918-F1EB-4BCE-BE23-F5E9851EE05C}"/>
-              </a:ext>
-              <a:ext uri="{C183D7F6-B498-43B3-948B-1728B52AA6E4}">
-                <adec:decorative xmlns:adec="http://schemas.microsoft.com/office/drawing/2017/decorative" val="1"/>
-              </a:ext>
-            </a:extLst>
-          </p:cNvPr>
-          <p:cNvSpPr>
-            <a:spLocks noGrp="1" noRot="1" noChangeAspect="1" noMove="1" noResize="1" noEditPoints="1" noAdjustHandles="1" noChangeArrowheads="1" noChangeShapeType="1" noTextEdit="1"/>
-          </p:cNvSpPr>
-          <p:nvPr>
-            <p:extLst>
-              <p:ext uri="{386F3935-93C4-4BCD-93E2-E3B085C9AB24}">
-                <p16:designElem xmlns:p16="http://schemas.microsoft.com/office/powerpoint/2015/main" val="1"/>
-              </p:ext>
-            </p:extLst>
-          </p:nvPr>
-        </p:nvSpPr>
-        <p:spPr>
-          <a:xfrm>
-            <a:off x="0" y="0"/>
-            <a:ext cx="12188952" cy="6857995"/>
-          </a:xfrm>
-          <a:prstGeom prst="rect">
-            <a:avLst/>
-          </a:prstGeom>
-          <a:ln>
-            <a:noFill/>
-          </a:ln>
-        </p:spPr>
-        <p:style>
-          <a:lnRef idx="2">
-            <a:schemeClr val="accent1">
-              <a:shade val="50000"/>
-            </a:schemeClr>
-          </a:lnRef>
-          <a:fillRef idx="1">
-            <a:schemeClr val="accent1"/>
-          </a:fillRef>
-          <a:effectRef idx="0">
-            <a:schemeClr val="accent1"/>
-          </a:effectRef>
-          <a:fontRef idx="minor">
-            <a:schemeClr val="lt1"/>
-          </a:fontRef>
-        </p:style>
-        <p:txBody>
-          <a:bodyPr rtlCol="0" anchor="ctr"/>
-          <a:lstStyle/>
-          <a:p>
-            <a:pPr algn="ctr"/>
-            <a:endParaRPr lang="en-US" dirty="0"/>
-          </a:p>
-        </p:txBody>
-      </p:sp>
-      <p:sp>
-        <p:nvSpPr>
-          <p:cNvPr id="2" name="Título 1">
-            <a:extLst>
-              <a:ext uri="{FF2B5EF4-FFF2-40B4-BE49-F238E27FC236}">
-                <a16:creationId xmlns:a16="http://schemas.microsoft.com/office/drawing/2014/main" id="{6A5E11E4-2D63-A00C-FA49-F06D8966FDF0}"/>
-              </a:ext>
-            </a:extLst>
-          </p:cNvPr>
-          <p:cNvSpPr>
-            <a:spLocks noGrp="1"/>
-          </p:cNvSpPr>
-          <p:nvPr>
-            <p:ph type="title"/>
-          </p:nvPr>
-        </p:nvSpPr>
-        <p:spPr>
-          <a:xfrm>
-            <a:off x="521208" y="976160"/>
-            <a:ext cx="11155680" cy="1636411"/>
-          </a:xfrm>
-        </p:spPr>
-        <p:txBody>
-          <a:bodyPr>
-            <a:normAutofit/>
-          </a:bodyPr>
-          <a:lstStyle/>
-          <a:p>
-            <a:r>
-              <a:rPr lang="es-ES" dirty="0"/>
-              <a:t>Características de MySQL</a:t>
-            </a:r>
-            <a:endParaRPr lang="es-MX" dirty="0"/>
-          </a:p>
-        </p:txBody>
-      </p:sp>
-      <p:sp>
-        <p:nvSpPr>
-          <p:cNvPr id="11" name="Rectangle 10">
-            <a:extLst>
-              <a:ext uri="{FF2B5EF4-FFF2-40B4-BE49-F238E27FC236}">
-                <a16:creationId xmlns:a16="http://schemas.microsoft.com/office/drawing/2014/main" id="{2062E862-C7F7-4CA1-B929-D0B75F5E9FB9}"/>
-              </a:ext>
-              <a:ext uri="{C183D7F6-B498-43B3-948B-1728B52AA6E4}">
-                <adec:decorative xmlns:adec="http://schemas.microsoft.com/office/drawing/2017/decorative" val="1"/>
-              </a:ext>
-            </a:extLst>
-          </p:cNvPr>
-          <p:cNvSpPr>
-            <a:spLocks noGrp="1" noRot="1" noChangeAspect="1" noMove="1" noResize="1" noEditPoints="1" noAdjustHandles="1" noChangeArrowheads="1" noChangeShapeType="1" noTextEdit="1"/>
-          </p:cNvSpPr>
-          <p:nvPr>
-            <p:extLst>
-              <p:ext uri="{386F3935-93C4-4BCD-93E2-E3B085C9AB24}">
-                <p16:designElem xmlns:p16="http://schemas.microsoft.com/office/powerpoint/2015/main" val="1"/>
-              </p:ext>
-            </p:extLst>
-          </p:nvPr>
-        </p:nvSpPr>
-        <p:spPr>
-          <a:xfrm>
-            <a:off x="517869" y="508090"/>
-            <a:ext cx="11155680" cy="149279"/>
-          </a:xfrm>
-          <a:prstGeom prst="rect">
-            <a:avLst/>
-          </a:prstGeom>
-          <a:solidFill>
-            <a:schemeClr val="tx1"/>
-          </a:solidFill>
-          <a:ln>
-            <a:noFill/>
-          </a:ln>
-        </p:spPr>
-        <p:style>
-          <a:lnRef idx="2">
-            <a:schemeClr val="accent1">
-              <a:shade val="50000"/>
-            </a:schemeClr>
-          </a:lnRef>
-          <a:fillRef idx="1">
-            <a:schemeClr val="accent1"/>
-          </a:fillRef>
-          <a:effectRef idx="0">
-            <a:schemeClr val="accent1"/>
-          </a:effectRef>
-          <a:fontRef idx="minor">
-            <a:schemeClr val="lt1"/>
-          </a:fontRef>
-        </p:style>
-        <p:txBody>
-          <a:bodyPr rtlCol="0" anchor="ctr"/>
-          <a:lstStyle/>
-          <a:p>
-            <a:pPr algn="ctr"/>
-            <a:endParaRPr lang="en-US"/>
-          </a:p>
-        </p:txBody>
-      </p:sp>
-      <p:graphicFrame>
-        <p:nvGraphicFramePr>
-          <p:cNvPr id="5" name="Marcador de contenido 2">
-            <a:extLst>
-              <a:ext uri="{FF2B5EF4-FFF2-40B4-BE49-F238E27FC236}">
-                <a16:creationId xmlns:a16="http://schemas.microsoft.com/office/drawing/2014/main" id="{3AAB82CC-535C-50D1-C4C8-F0C3AF0F6C9D}"/>
-              </a:ext>
-            </a:extLst>
-          </p:cNvPr>
-          <p:cNvGraphicFramePr>
-            <a:graphicFrameLocks noGrp="1"/>
-          </p:cNvGraphicFramePr>
-          <p:nvPr>
-            <p:ph idx="1"/>
-            <p:extLst>
-              <p:ext uri="{D42A27DB-BD31-4B8C-83A1-F6EECF244321}">
-                <p14:modId xmlns:p14="http://schemas.microsoft.com/office/powerpoint/2010/main" val="3590701855"/>
-              </p:ext>
-            </p:extLst>
-          </p:nvPr>
-        </p:nvGraphicFramePr>
-        <p:xfrm>
-          <a:off x="528320" y="2780521"/>
-          <a:ext cx="11155680" cy="3517642"/>
-        </p:xfrm>
-        <a:graphic>
-          <a:graphicData uri="http://schemas.openxmlformats.org/drawingml/2006/diagram">
-            <dgm:relIds xmlns:dgm="http://schemas.openxmlformats.org/drawingml/2006/diagram" xmlns:r="http://schemas.openxmlformats.org/officeDocument/2006/relationships" r:dm="rId2" r:lo="rId3" r:qs="rId4" r:cs="rId5"/>
-          </a:graphicData>
-        </a:graphic>
-      </p:graphicFrame>
-    </p:spTree>
-    <p:extLst>
-      <p:ext uri="{BB962C8B-B14F-4D97-AF65-F5344CB8AC3E}">
-        <p14:creationId xmlns:p14="http://schemas.microsoft.com/office/powerpoint/2010/main" val="2735820308"/>
-      </p:ext>
-    </p:extLst>
-  </p:cSld>
-  <p:clrMapOvr>
-    <a:masterClrMapping/>
-  </p:clrMapOvr>
-</p:sld>
-</file>
-
-<file path=ppt/slides/slide9.xml><?xml version="1.0" encoding="utf-8"?>
-<p:sld xmlns:a="http://schemas.openxmlformats.org/drawingml/2006/main" xmlns:r="http://schemas.openxmlformats.org/officeDocument/2006/relationships" xmlns:p="http://schemas.openxmlformats.org/presentationml/2006/main">
-  <p:cSld>
-    <p:bg>
-      <p:bgPr>
-        <a:solidFill>
-          <a:schemeClr val="bg1">
-            <a:lumMod val="50000"/>
-          </a:schemeClr>
-        </a:solidFill>
-        <a:effectLst/>
-      </p:bgPr>
-    </p:bg>
-    <p:spTree>
-      <p:nvGrpSpPr>
-        <p:cNvPr id="1" name=""/>
-        <p:cNvGrpSpPr/>
-        <p:nvPr/>
-      </p:nvGrpSpPr>
-      <p:grpSpPr>
-        <a:xfrm>
-          <a:off x="0" y="0"/>
-          <a:ext cx="0" cy="0"/>
-          <a:chOff x="0" y="0"/>
-          <a:chExt cx="0" cy="0"/>
-        </a:xfrm>
-      </p:grpSpPr>
-      <p:sp>
-        <p:nvSpPr>
-          <p:cNvPr id="2" name="Título 1">
-            <a:extLst>
-              <a:ext uri="{FF2B5EF4-FFF2-40B4-BE49-F238E27FC236}">
-                <a16:creationId xmlns:a16="http://schemas.microsoft.com/office/drawing/2014/main" id="{D7499F25-2711-BBEE-4CBC-1CA344121A8C}"/>
-              </a:ext>
-            </a:extLst>
-          </p:cNvPr>
-          <p:cNvSpPr>
-            <a:spLocks noGrp="1"/>
-          </p:cNvSpPr>
-          <p:nvPr>
-            <p:ph type="title"/>
-          </p:nvPr>
-        </p:nvSpPr>
-        <p:spPr/>
-        <p:txBody>
-          <a:bodyPr/>
-          <a:lstStyle/>
-          <a:p>
-            <a:r>
-              <a:rPr lang="es-MX" dirty="0"/>
-              <a:t>Base de datos utilizada y sus características</a:t>
-            </a:r>
-            <a:endParaRPr lang="es-CL" dirty="0"/>
-          </a:p>
-        </p:txBody>
-      </p:sp>
-      <p:sp>
-        <p:nvSpPr>
-          <p:cNvPr id="3" name="Marcador de contenido 2">
-            <a:extLst>
-              <a:ext uri="{FF2B5EF4-FFF2-40B4-BE49-F238E27FC236}">
-                <a16:creationId xmlns:a16="http://schemas.microsoft.com/office/drawing/2014/main" id="{44877D6F-BED1-4F42-9F36-CCAEE4411995}"/>
-              </a:ext>
-            </a:extLst>
-          </p:cNvPr>
-          <p:cNvSpPr>
-            <a:spLocks noGrp="1"/>
-          </p:cNvSpPr>
-          <p:nvPr>
-            <p:ph idx="1"/>
-          </p:nvPr>
-        </p:nvSpPr>
-        <p:spPr/>
-        <p:txBody>
-          <a:bodyPr/>
-          <a:lstStyle/>
-          <a:p>
-            <a:endParaRPr lang="es-CL" dirty="0"/>
-          </a:p>
-        </p:txBody>
-      </p:sp>
-    </p:spTree>
-    <p:extLst>
-      <p:ext uri="{BB962C8B-B14F-4D97-AF65-F5344CB8AC3E}">
-        <p14:creationId xmlns:p14="http://schemas.microsoft.com/office/powerpoint/2010/main" val="2257386156"/>
       </p:ext>
     </p:extLst>
   </p:cSld>

</xml_diff>